<commit_message>
fixing issue with selection of XRR document if multiple matches with different time points exist
</commit_message>
<xml_diff>
--- a/doc/SAPSailingAnalyticsArchitecture.pptx
+++ b/doc/SAPSailingAnalyticsArchitecture.pptx
@@ -5,10 +5,10 @@
     <p:sldMasterId id="2147483660" r:id="rId1"/>
   </p:sldMasterIdLst>
   <p:notesMasterIdLst>
-    <p:notesMasterId r:id="rId34"/>
+    <p:notesMasterId r:id="rId35"/>
   </p:notesMasterIdLst>
   <p:handoutMasterIdLst>
-    <p:handoutMasterId r:id="rId35"/>
+    <p:handoutMasterId r:id="rId36"/>
   </p:handoutMasterIdLst>
   <p:sldIdLst>
     <p:sldId id="340" r:id="rId2"/>
@@ -31,18 +31,19 @@
     <p:sldId id="349" r:id="rId19"/>
     <p:sldId id="356" r:id="rId20"/>
     <p:sldId id="357" r:id="rId21"/>
-    <p:sldId id="350" r:id="rId22"/>
-    <p:sldId id="351" r:id="rId23"/>
-    <p:sldId id="352" r:id="rId24"/>
-    <p:sldId id="353" r:id="rId25"/>
-    <p:sldId id="354" r:id="rId26"/>
-    <p:sldId id="325" r:id="rId27"/>
-    <p:sldId id="355" r:id="rId28"/>
-    <p:sldId id="364" r:id="rId29"/>
-    <p:sldId id="286" r:id="rId30"/>
-    <p:sldId id="310" r:id="rId31"/>
-    <p:sldId id="265" r:id="rId32"/>
-    <p:sldId id="339" r:id="rId33"/>
+    <p:sldId id="368" r:id="rId22"/>
+    <p:sldId id="350" r:id="rId23"/>
+    <p:sldId id="351" r:id="rId24"/>
+    <p:sldId id="352" r:id="rId25"/>
+    <p:sldId id="353" r:id="rId26"/>
+    <p:sldId id="354" r:id="rId27"/>
+    <p:sldId id="325" r:id="rId28"/>
+    <p:sldId id="355" r:id="rId29"/>
+    <p:sldId id="364" r:id="rId30"/>
+    <p:sldId id="286" r:id="rId31"/>
+    <p:sldId id="310" r:id="rId32"/>
+    <p:sldId id="265" r:id="rId33"/>
+    <p:sldId id="339" r:id="rId34"/>
   </p:sldIdLst>
   <p:sldSz cx="9144000" cy="6858000" type="screen4x3"/>
   <p:notesSz cx="6858000" cy="9144000"/>
@@ -230,7 +231,7 @@
     </p:spTree>
     <p:extLst>
       <p:ext uri="{BB962C8B-B14F-4D97-AF65-F5344CB8AC3E}">
-        <p14:creationId xmlns="" xmlns:p14="http://schemas.microsoft.com/office/powerpoint/2010/main" val="3780670118"/>
+        <p14:creationId xmlns:p14="http://schemas.microsoft.com/office/powerpoint/2010/main" xmlns="" val="3780670118"/>
       </p:ext>
     </p:extLst>
   </p:cSld>
@@ -379,7 +380,7 @@
     </p:spTree>
     <p:extLst>
       <p:ext uri="{BB962C8B-B14F-4D97-AF65-F5344CB8AC3E}">
-        <p14:creationId xmlns="" xmlns:p14="http://schemas.microsoft.com/office/powerpoint/2010/main" val="1908748421"/>
+        <p14:creationId xmlns:p14="http://schemas.microsoft.com/office/powerpoint/2010/main" xmlns="" val="1908748421"/>
       </p:ext>
     </p:extLst>
   </p:cSld>
@@ -810,7 +811,7 @@
             <a:fld id="{7D8C2C35-2B8A-446E-BEC0-FD36716C29AC}" type="slidenum">
               <a:rPr lang="de-DE" smtClean="0"/>
               <a:pPr/>
-              <a:t>21</a:t>
+              <a:t>22</a:t>
             </a:fld>
             <a:endParaRPr lang="de-DE" dirty="0"/>
           </a:p>
@@ -892,7 +893,7 @@
             <a:fld id="{7D8C2C35-2B8A-446E-BEC0-FD36716C29AC}" type="slidenum">
               <a:rPr lang="de-DE" smtClean="0"/>
               <a:pPr/>
-              <a:t>22</a:t>
+              <a:t>23</a:t>
             </a:fld>
             <a:endParaRPr lang="de-DE" dirty="0"/>
           </a:p>
@@ -974,7 +975,7 @@
             <a:fld id="{7D8C2C35-2B8A-446E-BEC0-FD36716C29AC}" type="slidenum">
               <a:rPr lang="de-DE" smtClean="0"/>
               <a:pPr/>
-              <a:t>23</a:t>
+              <a:t>24</a:t>
             </a:fld>
             <a:endParaRPr lang="de-DE" dirty="0"/>
           </a:p>
@@ -1056,7 +1057,7 @@
             <a:fld id="{7D8C2C35-2B8A-446E-BEC0-FD36716C29AC}" type="slidenum">
               <a:rPr lang="de-DE" smtClean="0"/>
               <a:pPr/>
-              <a:t>24</a:t>
+              <a:t>25</a:t>
             </a:fld>
             <a:endParaRPr lang="de-DE" dirty="0"/>
           </a:p>
@@ -1138,7 +1139,7 @@
             <a:fld id="{7D8C2C35-2B8A-446E-BEC0-FD36716C29AC}" type="slidenum">
               <a:rPr lang="de-DE" smtClean="0"/>
               <a:pPr/>
-              <a:t>25</a:t>
+              <a:t>26</a:t>
             </a:fld>
             <a:endParaRPr lang="de-DE" dirty="0"/>
           </a:p>
@@ -1220,7 +1221,7 @@
             <a:fld id="{7D8C2C35-2B8A-446E-BEC0-FD36716C29AC}" type="slidenum">
               <a:rPr lang="de-DE" smtClean="0"/>
               <a:pPr/>
-              <a:t>26</a:t>
+              <a:t>27</a:t>
             </a:fld>
             <a:endParaRPr lang="de-DE" dirty="0"/>
           </a:p>
@@ -1302,7 +1303,7 @@
             <a:fld id="{7D8C2C35-2B8A-446E-BEC0-FD36716C29AC}" type="slidenum">
               <a:rPr lang="de-DE" smtClean="0"/>
               <a:pPr/>
-              <a:t>27</a:t>
+              <a:t>28</a:t>
             </a:fld>
             <a:endParaRPr lang="de-DE" dirty="0"/>
           </a:p>
@@ -1384,7 +1385,7 @@
             <a:fld id="{7D8C2C35-2B8A-446E-BEC0-FD36716C29AC}" type="slidenum">
               <a:rPr lang="de-DE" smtClean="0"/>
               <a:pPr/>
-              <a:t>28</a:t>
+              <a:t>29</a:t>
             </a:fld>
             <a:endParaRPr lang="de-DE" dirty="0"/>
           </a:p>
@@ -1548,7 +1549,7 @@
             <a:fld id="{7D8C2C35-2B8A-446E-BEC0-FD36716C29AC}" type="slidenum">
               <a:rPr lang="de-DE" smtClean="0"/>
               <a:pPr/>
-              <a:t>29</a:t>
+              <a:t>30</a:t>
             </a:fld>
             <a:endParaRPr lang="de-DE" dirty="0"/>
           </a:p>
@@ -1630,7 +1631,7 @@
             <a:fld id="{7D8C2C35-2B8A-446E-BEC0-FD36716C29AC}" type="slidenum">
               <a:rPr lang="de-DE" smtClean="0"/>
               <a:pPr/>
-              <a:t>30</a:t>
+              <a:t>31</a:t>
             </a:fld>
             <a:endParaRPr lang="de-DE" dirty="0"/>
           </a:p>
@@ -1679,7 +1680,7 @@
             <a:fld id="{7D8C2C35-2B8A-446E-BEC0-FD36716C29AC}" type="slidenum">
               <a:rPr lang="de-DE" smtClean="0"/>
               <a:pPr/>
-              <a:t>31</a:t>
+              <a:t>32</a:t>
             </a:fld>
             <a:endParaRPr lang="de-DE" dirty="0"/>
           </a:p>
@@ -1794,7 +1795,7 @@
             <a:fld id="{7D8C2C35-2B8A-446E-BEC0-FD36716C29AC}" type="slidenum">
               <a:rPr lang="de-DE" smtClean="0"/>
               <a:pPr/>
-              <a:t>32</a:t>
+              <a:t>33</a:t>
             </a:fld>
             <a:endParaRPr lang="de-DE" dirty="0"/>
           </a:p>
@@ -2516,7 +2517,7 @@
           <a:blip r:embed="rId2" cstate="print">
             <a:extLst>
               <a:ext uri="{28A0092B-C50C-407E-A947-70E740481C1C}">
-                <a14:useLocalDpi xmlns="" xmlns:a14="http://schemas.microsoft.com/office/drawing/2010/main" val="0"/>
+                <a14:useLocalDpi xmlns:a14="http://schemas.microsoft.com/office/drawing/2010/main" xmlns="" val="0"/>
               </a:ext>
             </a:extLst>
           </a:blip>
@@ -4379,7 +4380,7 @@
           <a:blip r:embed="rId2" cstate="print">
             <a:extLst>
               <a:ext uri="{28A0092B-C50C-407E-A947-70E740481C1C}">
-                <a14:useLocalDpi xmlns="" xmlns:a14="http://schemas.microsoft.com/office/drawing/2010/main" val="0"/>
+                <a14:useLocalDpi xmlns:a14="http://schemas.microsoft.com/office/drawing/2010/main" xmlns="" val="0"/>
               </a:ext>
             </a:extLst>
           </a:blip>
@@ -5292,7 +5293,7 @@
           <a:blip r:embed="rId2" cstate="print">
             <a:extLst>
               <a:ext uri="{28A0092B-C50C-407E-A947-70E740481C1C}">
-                <a14:useLocalDpi xmlns="" xmlns:a14="http://schemas.microsoft.com/office/drawing/2010/main" val="0"/>
+                <a14:useLocalDpi xmlns:a14="http://schemas.microsoft.com/office/drawing/2010/main" xmlns="" val="0"/>
               </a:ext>
             </a:extLst>
           </a:blip>
@@ -5495,7 +5496,7 @@
           <a:blip r:embed="rId2" cstate="print">
             <a:extLst>
               <a:ext uri="{28A0092B-C50C-407E-A947-70E740481C1C}">
-                <a14:useLocalDpi xmlns="" xmlns:a14="http://schemas.microsoft.com/office/drawing/2010/main" val="0"/>
+                <a14:useLocalDpi xmlns:a14="http://schemas.microsoft.com/office/drawing/2010/main" xmlns="" val="0"/>
               </a:ext>
             </a:extLst>
           </a:blip>
@@ -5871,7 +5872,7 @@
           <a:blip r:embed="rId2" cstate="print">
             <a:extLst>
               <a:ext uri="{28A0092B-C50C-407E-A947-70E740481C1C}">
-                <a14:useLocalDpi xmlns="" xmlns:a14="http://schemas.microsoft.com/office/drawing/2010/main" val="0"/>
+                <a14:useLocalDpi xmlns:a14="http://schemas.microsoft.com/office/drawing/2010/main" xmlns="" val="0"/>
               </a:ext>
             </a:extLst>
           </a:blip>
@@ -6099,7 +6100,7 @@
           <a:blip r:embed="rId2" cstate="print">
             <a:extLst>
               <a:ext uri="{28A0092B-C50C-407E-A947-70E740481C1C}">
-                <a14:useLocalDpi xmlns="" xmlns:a14="http://schemas.microsoft.com/office/drawing/2010/main" val="0"/>
+                <a14:useLocalDpi xmlns:a14="http://schemas.microsoft.com/office/drawing/2010/main" xmlns="" val="0"/>
               </a:ext>
             </a:extLst>
           </a:blip>
@@ -6319,7 +6320,7 @@
           <a:blip r:embed="rId2" cstate="print">
             <a:extLst>
               <a:ext uri="{28A0092B-C50C-407E-A947-70E740481C1C}">
-                <a14:useLocalDpi xmlns="" xmlns:a14="http://schemas.microsoft.com/office/drawing/2010/main" val="0"/>
+                <a14:useLocalDpi xmlns:a14="http://schemas.microsoft.com/office/drawing/2010/main" xmlns="" val="0"/>
               </a:ext>
             </a:extLst>
           </a:blip>
@@ -7404,7 +7405,7 @@
           <a:blip r:embed="rId4" cstate="print">
             <a:extLst>
               <a:ext uri="{28A0092B-C50C-407E-A947-70E740481C1C}">
-                <a14:useLocalDpi xmlns="" xmlns:a14="http://schemas.microsoft.com/office/drawing/2010/main" val="0"/>
+                <a14:useLocalDpi xmlns:a14="http://schemas.microsoft.com/office/drawing/2010/main" xmlns="" val="0"/>
               </a:ext>
             </a:extLst>
           </a:blip>
@@ -7725,7 +7726,12 @@
             <p:ph type="body" sz="quarter" idx="10"/>
           </p:nvPr>
         </p:nvSpPr>
-        <p:spPr/>
+        <p:spPr>
+          <a:xfrm>
+            <a:off x="324000" y="1574305"/>
+            <a:ext cx="8494713" cy="4610364"/>
+          </a:xfrm>
+        </p:spPr>
         <p:txBody>
           <a:bodyPr/>
           <a:lstStyle/>
@@ -7767,11 +7773,7 @@
             <a:pPr lvl="2"/>
             <a:r>
               <a:rPr lang="en-US" dirty="0" smtClean="0"/>
-              <a:t>Insert-only; queries aggregate on the </a:t>
-            </a:r>
-            <a:r>
-              <a:rPr lang="en-US" dirty="0" smtClean="0"/>
-              <a:t>fly</a:t>
+              <a:t>Insert-only; queries aggregate on the fly</a:t>
             </a:r>
           </a:p>
           <a:p>
@@ -7806,7 +7808,6 @@
               <a:rPr lang="en-US" dirty="0" smtClean="0"/>
               <a:t> “locking”</a:t>
             </a:r>
-            <a:endParaRPr lang="en-US" dirty="0" smtClean="0"/>
           </a:p>
           <a:p>
             <a:pPr lvl="2"/>
@@ -7819,7 +7820,41 @@
             <a:pPr lvl="1"/>
             <a:r>
               <a:rPr lang="en-US" dirty="0" smtClean="0"/>
-              <a:t>Python to render HTML front-end</a:t>
+              <a:t>Embedded Jetty as Servlet/</a:t>
+            </a:r>
+            <a:r>
+              <a:rPr lang="en-US" dirty="0" err="1" smtClean="0"/>
+              <a:t>RESTlet</a:t>
+            </a:r>
+            <a:r>
+              <a:rPr lang="en-US" dirty="0" smtClean="0"/>
+              <a:t> container</a:t>
+            </a:r>
+          </a:p>
+          <a:p>
+            <a:pPr lvl="2"/>
+            <a:r>
+              <a:rPr lang="en-US" dirty="0" smtClean="0"/>
+              <a:t>Explicit registration of </a:t>
+            </a:r>
+            <a:r>
+              <a:rPr lang="en-US" dirty="0" err="1" smtClean="0"/>
+              <a:t>RESTlets</a:t>
+            </a:r>
+            <a:r>
+              <a:rPr lang="en-US" dirty="0" smtClean="0"/>
+              <a:t> in bundle activator</a:t>
+            </a:r>
+          </a:p>
+          <a:p>
+            <a:pPr lvl="1"/>
+            <a:r>
+              <a:rPr lang="en-US" dirty="0" smtClean="0"/>
+              <a:t>Python </a:t>
+            </a:r>
+            <a:r>
+              <a:rPr lang="en-US" dirty="0" smtClean="0"/>
+              <a:t>to render HTML front-end</a:t>
             </a:r>
           </a:p>
           <a:p>
@@ -7845,15 +7880,7 @@
             </a:r>
             <a:r>
               <a:rPr lang="en-US" dirty="0" smtClean="0"/>
-              <a:t>, Maven</a:t>
-            </a:r>
-            <a:r>
-              <a:rPr lang="en-US" dirty="0" smtClean="0"/>
-              <a:t>, </a:t>
-            </a:r>
-            <a:r>
-              <a:rPr lang="en-US" dirty="0" smtClean="0"/>
-              <a:t>Hudson, </a:t>
+              <a:t>, Maven, Hudson, </a:t>
             </a:r>
             <a:r>
               <a:rPr lang="en-US" dirty="0" err="1" smtClean="0"/>
@@ -9136,10 +9163,6 @@
               </a:rPr>
               <a:t>Expedition</a:t>
             </a:r>
-            <a:endParaRPr lang="en-US" sz="1800" kern="0" dirty="0" smtClean="0">
-              <a:ea typeface="Arial Unicode MS" pitchFamily="34" charset="-128"/>
-              <a:cs typeface="Arial Unicode MS" pitchFamily="34" charset="-128"/>
-            </a:endParaRPr>
           </a:p>
         </p:txBody>
       </p:sp>
@@ -9551,16 +9574,6 @@
               </a:rPr>
               <a:t>Java Equinox</a:t>
             </a:r>
-            <a:endParaRPr kumimoji="0" lang="en-US" b="0" i="0" u="none" strike="noStrike" kern="0" cap="none" spc="0" normalizeH="0" baseline="0" noProof="0" dirty="0" smtClean="0">
-              <a:ln>
-                <a:noFill/>
-              </a:ln>
-              <a:effectLst/>
-              <a:uLnTx/>
-              <a:uFillTx/>
-              <a:ea typeface="Arial Unicode MS" pitchFamily="34" charset="-128"/>
-              <a:cs typeface="Arial Unicode MS" pitchFamily="34" charset="-128"/>
-            </a:endParaRPr>
           </a:p>
         </p:txBody>
       </p:sp>
@@ -9621,16 +9634,6 @@
               </a:rPr>
               <a:t>Apache</a:t>
             </a:r>
-            <a:endParaRPr kumimoji="0" lang="en-US" b="0" i="0" u="none" strike="noStrike" kern="0" cap="none" spc="0" normalizeH="0" baseline="0" noProof="0" dirty="0" smtClean="0">
-              <a:ln>
-                <a:noFill/>
-              </a:ln>
-              <a:effectLst/>
-              <a:uLnTx/>
-              <a:uFillTx/>
-              <a:ea typeface="Arial Unicode MS" pitchFamily="34" charset="-128"/>
-              <a:cs typeface="Arial Unicode MS" pitchFamily="34" charset="-128"/>
-            </a:endParaRPr>
           </a:p>
         </p:txBody>
       </p:sp>
@@ -9691,16 +9694,6 @@
               </a:rPr>
               <a:t>Python</a:t>
             </a:r>
-            <a:endParaRPr kumimoji="0" lang="en-US" b="0" i="0" u="none" strike="noStrike" kern="0" cap="none" spc="0" normalizeH="0" baseline="0" noProof="0" dirty="0" smtClean="0">
-              <a:ln>
-                <a:noFill/>
-              </a:ln>
-              <a:effectLst/>
-              <a:uLnTx/>
-              <a:uFillTx/>
-              <a:ea typeface="Arial Unicode MS" pitchFamily="34" charset="-128"/>
-              <a:cs typeface="Arial Unicode MS" pitchFamily="34" charset="-128"/>
-            </a:endParaRPr>
           </a:p>
         </p:txBody>
       </p:sp>
@@ -9829,10 +9822,6 @@
               </a:rPr>
               <a:t> data</a:t>
             </a:r>
-            <a:endParaRPr lang="en-US" sz="1800" kern="0" dirty="0" smtClean="0">
-              <a:ea typeface="Arial Unicode MS" pitchFamily="34" charset="-128"/>
-              <a:cs typeface="Arial Unicode MS" pitchFamily="34" charset="-128"/>
-            </a:endParaRPr>
           </a:p>
         </p:txBody>
       </p:sp>
@@ -10500,7 +10489,7 @@
           <a:blip r:embed="rId3" cstate="screen">
             <a:extLst>
               <a:ext uri="{28A0092B-C50C-407E-A947-70E740481C1C}">
-                <a14:useLocalDpi xmlns="" xmlns:a14="http://schemas.microsoft.com/office/drawing/2010/main"/>
+                <a14:useLocalDpi xmlns:a14="http://schemas.microsoft.com/office/drawing/2010/main" xmlns=""/>
               </a:ext>
             </a:extLst>
           </a:blip>
@@ -10517,7 +10506,7 @@
           </a:ln>
           <a:extLst>
             <a:ext uri="{909E8E84-426E-40DD-AFC4-6F175D3DCCD1}">
-              <a14:hiddenFill xmlns="" xmlns:a14="http://schemas.microsoft.com/office/drawing/2010/main">
+              <a14:hiddenFill xmlns:a14="http://schemas.microsoft.com/office/drawing/2010/main" xmlns="">
                 <a:solidFill>
                   <a:srgbClr val="FFFFFF"/>
                 </a:solidFill>
@@ -10603,7 +10592,7 @@
           <a:p>
             <a:r>
               <a:rPr lang="en-US" dirty="0" smtClean="0"/>
-              <a:t>Insert page title </a:t>
+              <a:t>Google Web Toolkit (GWT)</a:t>
             </a:r>
             <a:endParaRPr lang="en-US" dirty="0"/>
           </a:p>
@@ -10627,53 +10616,64 @@
             <a:pPr lvl="0"/>
             <a:r>
               <a:rPr lang="en-US" dirty="0" smtClean="0"/>
-              <a:t>First level</a:t>
-            </a:r>
-          </a:p>
-          <a:p>
-            <a:pPr lvl="1"/>
-            <a:r>
-              <a:rPr lang="en-US" dirty="0" smtClean="0"/>
-              <a:t>Java and OSGi, </a:t>
-            </a:r>
-            <a:r>
-              <a:rPr lang="en-US" dirty="0" err="1" smtClean="0"/>
-              <a:t>Git</a:t>
-            </a:r>
-            <a:r>
-              <a:rPr lang="en-US" dirty="0" smtClean="0"/>
-              <a:t>, Maven, </a:t>
-            </a:r>
-            <a:r>
-              <a:rPr lang="en-US" dirty="0" err="1" smtClean="0"/>
-              <a:t>MongoDB</a:t>
+              <a:t>Allows Java developers to build rich, dynamic HTML5 applications</a:t>
+            </a:r>
+          </a:p>
+          <a:p>
+            <a:pPr lvl="2"/>
+            <a:r>
+              <a:rPr lang="en-US" dirty="0" smtClean="0"/>
+              <a:t>Cross-compiles Java to efficient JavaScript</a:t>
+            </a:r>
+          </a:p>
+          <a:p>
+            <a:pPr lvl="2"/>
+            <a:r>
+              <a:rPr lang="en-US" dirty="0" smtClean="0"/>
+              <a:t>Uses the Eclipse Java debugging infrastructure</a:t>
+            </a:r>
+          </a:p>
+          <a:p>
+            <a:pPr lvl="2"/>
+            <a:r>
+              <a:rPr lang="en-US" dirty="0" smtClean="0"/>
+              <a:t>Can be made play reasonably well with OSGi</a:t>
+            </a:r>
+          </a:p>
+          <a:p>
+            <a:pPr lvl="2"/>
+            <a:r>
+              <a:rPr lang="en-US" dirty="0" smtClean="0"/>
+              <a:t>Code can be shared between server and browser if a few constraints are obeyed</a:t>
+            </a:r>
+          </a:p>
+          <a:p>
+            <a:pPr lvl="2"/>
+            <a:r>
+              <a:rPr lang="en-US" dirty="0" smtClean="0"/>
+              <a:t>Powerful Eclipse JDT features available also for browser code</a:t>
+            </a:r>
+          </a:p>
+          <a:p>
+            <a:r>
+              <a:rPr lang="en-US" dirty="0" smtClean="0"/>
+              <a:t>New versions of the leader-board and administration console</a:t>
+            </a:r>
+          </a:p>
+          <a:p>
+            <a:pPr lvl="2"/>
+            <a:r>
+              <a:rPr lang="en-US" dirty="0" smtClean="0"/>
+              <a:t>Replaces Python server instance</a:t>
+            </a:r>
+          </a:p>
+          <a:p>
+            <a:pPr lvl="2"/>
+            <a:r>
+              <a:rPr lang="en-US" dirty="0" smtClean="0"/>
+              <a:t>Runs more efficiently because more can be done in the browser more easily</a:t>
             </a:r>
             <a:endParaRPr lang="en-US" dirty="0" smtClean="0"/>
-          </a:p>
-          <a:p>
-            <a:pPr lvl="1"/>
-            <a:r>
-              <a:rPr lang="en-US" dirty="0" smtClean="0"/>
-              <a:t>Recording and Analyzing Real-World Data in Memory with Java</a:t>
-            </a:r>
-          </a:p>
-          <a:p>
-            <a:pPr lvl="0"/>
-            <a:endParaRPr lang="en-US" dirty="0" smtClean="0"/>
-          </a:p>
-          <a:p>
-            <a:pPr lvl="1"/>
-            <a:r>
-              <a:rPr lang="en-US" dirty="0" smtClean="0"/>
-              <a:t>Second level</a:t>
-            </a:r>
-          </a:p>
-          <a:p>
-            <a:pPr lvl="2"/>
-            <a:r>
-              <a:rPr lang="en-US" dirty="0" smtClean="0"/>
-              <a:t>Third level</a:t>
-            </a:r>
           </a:p>
         </p:txBody>
       </p:sp>
@@ -11416,12 +11416,12 @@
       </p:grpSpPr>
       <p:sp>
         <p:nvSpPr>
-          <p:cNvPr id="3" name="Title 2"/>
+          <p:cNvPr id="2" name="Title 1"/>
           <p:cNvSpPr>
             <a:spLocks noGrp="1"/>
           </p:cNvSpPr>
           <p:nvPr>
-            <p:ph type="ctrTitle"/>
+            <p:ph type="title"/>
           </p:nvPr>
         </p:nvSpPr>
         <p:spPr/>
@@ -11430,55 +11430,44 @@
           <a:lstStyle/>
           <a:p>
             <a:r>
-              <a:rPr lang="en-US" sz="3200" dirty="0" smtClean="0"/>
-              <a:t>Towards Web Bundles and </a:t>
-            </a:r>
-            <a:r>
-              <a:rPr lang="en-US" sz="3200" dirty="0" err="1" smtClean="0"/>
-              <a:t>Restlets</a:t>
-            </a:r>
-            <a:endParaRPr lang="en-US" sz="3200" dirty="0" smtClean="0"/>
+              <a:rPr lang="en-US" dirty="0" smtClean="0"/>
+              <a:t>Leaderboard as Re-Built with GWT</a:t>
+            </a:r>
+            <a:endParaRPr lang="en-US" dirty="0"/>
           </a:p>
         </p:txBody>
       </p:sp>
       <p:pic>
         <p:nvPicPr>
-          <p:cNvPr id="7" name="Picture 2" descr="C:\Users\d019534\AppData\Local\Microsoft\Windows\Temporary Internet Files\Content.IE5\M8B9MV8Z\273539_l_srgb_s_gl[1].jpg"/>
+          <p:cNvPr id="2051" name="Picture 3"/>
           <p:cNvPicPr>
-            <a:picLocks noGrp="1" noChangeAspect="1" noChangeArrowheads="1"/>
+            <a:picLocks noChangeAspect="1" noChangeArrowheads="1"/>
           </p:cNvPicPr>
-          <p:nvPr>
-            <p:ph type="pic" sz="quarter" idx="11"/>
-          </p:nvPr>
+          <p:nvPr/>
         </p:nvPicPr>
-        <p:blipFill rotWithShape="1">
-          <a:blip r:embed="rId3" cstate="screen">
-            <a:extLst>
-              <a:ext uri="{28A0092B-C50C-407E-A947-70E740481C1C}">
-                <a14:useLocalDpi xmlns="" xmlns:a14="http://schemas.microsoft.com/office/drawing/2010/main"/>
-              </a:ext>
-            </a:extLst>
-          </a:blip>
-          <a:srcRect l="10" r="10"/>
-          <a:stretch/>
+        <p:blipFill>
+          <a:blip r:embed="rId2" cstate="print"/>
+          <a:srcRect/>
+          <a:stretch>
+            <a:fillRect/>
+          </a:stretch>
         </p:blipFill>
         <p:spPr bwMode="auto">
+          <a:xfrm>
+            <a:off x="613158" y="1315567"/>
+            <a:ext cx="7958085" cy="4864552"/>
+          </a:xfrm>
           <a:prstGeom prst="rect">
             <a:avLst/>
           </a:prstGeom>
           <a:noFill/>
-          <a:ln>
+          <a:ln w="9525">
             <a:noFill/>
+            <a:miter lim="800000"/>
+            <a:headEnd/>
+            <a:tailEnd/>
           </a:ln>
-          <a:extLst>
-            <a:ext uri="{909E8E84-426E-40DD-AFC4-6F175D3DCCD1}">
-              <a14:hiddenFill xmlns="" xmlns:a14="http://schemas.microsoft.com/office/drawing/2010/main">
-                <a:solidFill>
-                  <a:srgbClr val="FFFFFF"/>
-                </a:solidFill>
-              </a14:hiddenFill>
-            </a:ext>
-          </a:extLst>
+          <a:effectLst/>
         </p:spPr>
       </p:pic>
     </p:spTree>
@@ -11486,6 +11475,18 @@
   <p:clrMapOvr>
     <a:masterClrMapping/>
   </p:clrMapOvr>
+  <mc:AlternateContent xmlns:mc="http://schemas.openxmlformats.org/markup-compatibility/2006">
+    <mc:Choice xmlns="" xmlns:p14="http://schemas.microsoft.com/office/powerpoint/2010/main" Requires="p14">
+      <p:transition spd="med" p14:dur="700">
+        <p:fade/>
+      </p:transition>
+    </mc:Choice>
+    <mc:Fallback>
+      <p:transition spd="med">
+        <p:fade/>
+      </p:transition>
+    </mc:Fallback>
+  </mc:AlternateContent>
 </p:sld>
 </file>
 
@@ -11508,12 +11509,12 @@
       </p:grpSpPr>
       <p:sp>
         <p:nvSpPr>
-          <p:cNvPr id="2" name="Title 1"/>
+          <p:cNvPr id="3" name="Title 2"/>
           <p:cNvSpPr>
             <a:spLocks noGrp="1"/>
           </p:cNvSpPr>
           <p:nvPr>
-            <p:ph type="title"/>
+            <p:ph type="ctrTitle"/>
           </p:nvPr>
         </p:nvSpPr>
         <p:spPr/>
@@ -11522,94 +11523,62 @@
           <a:lstStyle/>
           <a:p>
             <a:r>
-              <a:rPr lang="en-US" dirty="0" smtClean="0"/>
-              <a:t>Insert page title </a:t>
-            </a:r>
-            <a:endParaRPr lang="en-US" dirty="0"/>
-          </a:p>
-        </p:txBody>
-      </p:sp>
-      <p:sp>
-        <p:nvSpPr>
-          <p:cNvPr id="3" name="Text Placeholder 2"/>
-          <p:cNvSpPr>
-            <a:spLocks noGrp="1"/>
-          </p:cNvSpPr>
-          <p:nvPr>
-            <p:ph type="body" sz="quarter" idx="10"/>
-          </p:nvPr>
-        </p:nvSpPr>
-        <p:spPr/>
-        <p:txBody>
-          <a:bodyPr/>
-          <a:lstStyle/>
-          <a:p>
-            <a:pPr lvl="0"/>
-            <a:r>
-              <a:rPr lang="en-US" dirty="0" smtClean="0"/>
-              <a:t>First level</a:t>
-            </a:r>
-          </a:p>
-          <a:p>
-            <a:pPr lvl="1"/>
-            <a:r>
-              <a:rPr lang="en-US" dirty="0" smtClean="0"/>
-              <a:t>Java and OSGi, </a:t>
-            </a:r>
-            <a:r>
-              <a:rPr lang="en-US" dirty="0" err="1" smtClean="0"/>
-              <a:t>Git</a:t>
-            </a:r>
-            <a:r>
-              <a:rPr lang="en-US" dirty="0" smtClean="0"/>
-              <a:t>, Maven, </a:t>
-            </a:r>
-            <a:r>
-              <a:rPr lang="en-US" dirty="0" err="1" smtClean="0"/>
-              <a:t>MongoDB</a:t>
-            </a:r>
-            <a:endParaRPr lang="en-US" dirty="0" smtClean="0"/>
-          </a:p>
-          <a:p>
-            <a:pPr lvl="1"/>
-            <a:r>
-              <a:rPr lang="en-US" dirty="0" smtClean="0"/>
-              <a:t>Recording and Analyzing Real-World Data in Memory with Java</a:t>
-            </a:r>
-          </a:p>
-          <a:p>
-            <a:pPr lvl="0"/>
-            <a:endParaRPr lang="en-US" dirty="0" smtClean="0"/>
-          </a:p>
-          <a:p>
-            <a:pPr lvl="1"/>
-            <a:r>
-              <a:rPr lang="en-US" dirty="0" smtClean="0"/>
-              <a:t>Second level</a:t>
-            </a:r>
-          </a:p>
-          <a:p>
-            <a:pPr lvl="2"/>
-            <a:r>
-              <a:rPr lang="en-US" dirty="0" smtClean="0"/>
-              <a:t>Third level</a:t>
-            </a:r>
-          </a:p>
-        </p:txBody>
-      </p:sp>
+              <a:rPr lang="en-US" sz="3200" dirty="0" smtClean="0"/>
+              <a:t>Towards Web Bundles and </a:t>
+            </a:r>
+            <a:r>
+              <a:rPr lang="en-US" sz="3200" dirty="0" err="1" smtClean="0"/>
+              <a:t>Restlets</a:t>
+            </a:r>
+            <a:endParaRPr lang="en-US" sz="3200" dirty="0" smtClean="0"/>
+          </a:p>
+        </p:txBody>
+      </p:sp>
+      <p:pic>
+        <p:nvPicPr>
+          <p:cNvPr id="7" name="Picture 2" descr="C:\Users\d019534\AppData\Local\Microsoft\Windows\Temporary Internet Files\Content.IE5\M8B9MV8Z\273539_l_srgb_s_gl[1].jpg"/>
+          <p:cNvPicPr>
+            <a:picLocks noGrp="1" noChangeAspect="1" noChangeArrowheads="1"/>
+          </p:cNvPicPr>
+          <p:nvPr>
+            <p:ph type="pic" sz="quarter" idx="11"/>
+          </p:nvPr>
+        </p:nvPicPr>
+        <p:blipFill rotWithShape="1">
+          <a:blip r:embed="rId3" cstate="screen">
+            <a:extLst>
+              <a:ext uri="{28A0092B-C50C-407E-A947-70E740481C1C}">
+                <a14:useLocalDpi xmlns:a14="http://schemas.microsoft.com/office/drawing/2010/main" xmlns=""/>
+              </a:ext>
+            </a:extLst>
+          </a:blip>
+          <a:srcRect l="10" r="10"/>
+          <a:stretch/>
+        </p:blipFill>
+        <p:spPr bwMode="auto">
+          <a:prstGeom prst="rect">
+            <a:avLst/>
+          </a:prstGeom>
+          <a:noFill/>
+          <a:ln>
+            <a:noFill/>
+          </a:ln>
+          <a:extLst>
+            <a:ext uri="{909E8E84-426E-40DD-AFC4-6F175D3DCCD1}">
+              <a14:hiddenFill xmlns:a14="http://schemas.microsoft.com/office/drawing/2010/main" xmlns="">
+                <a:solidFill>
+                  <a:srgbClr val="FFFFFF"/>
+                </a:solidFill>
+              </a14:hiddenFill>
+            </a:ext>
+          </a:extLst>
+        </p:spPr>
+      </p:pic>
     </p:spTree>
   </p:cSld>
   <p:clrMapOvr>
     <a:masterClrMapping/>
   </p:clrMapOvr>
-  <p:transition spd="med"/>
-  <p:timing>
-    <p:tnLst>
-      <p:par>
-        <p:cTn id="1" dur="indefinite" restart="never" nodeType="tmRoot"/>
-      </p:par>
-    </p:tnLst>
-  </p:timing>
 </p:sld>
 </file>
 
@@ -11632,12 +11601,12 @@
       </p:grpSpPr>
       <p:sp>
         <p:nvSpPr>
-          <p:cNvPr id="3" name="Title 2"/>
+          <p:cNvPr id="2" name="Title 1"/>
           <p:cNvSpPr>
             <a:spLocks noGrp="1"/>
           </p:cNvSpPr>
           <p:nvPr>
-            <p:ph type="ctrTitle"/>
+            <p:ph type="title"/>
           </p:nvPr>
         </p:nvSpPr>
         <p:spPr/>
@@ -11646,57 +11615,94 @@
           <a:lstStyle/>
           <a:p>
             <a:r>
-              <a:rPr lang="en-US" sz="3200" dirty="0" smtClean="0"/>
-              <a:t>Caching and Locking in a Highly Concurrent Environment</a:t>
-            </a:r>
-          </a:p>
-        </p:txBody>
-      </p:sp>
-      <p:pic>
-        <p:nvPicPr>
-          <p:cNvPr id="7" name="Picture 2" descr="C:\Users\d019534\AppData\Local\Microsoft\Windows\Temporary Internet Files\Content.IE5\M8B9MV8Z\273539_l_srgb_s_gl[1].jpg"/>
-          <p:cNvPicPr>
-            <a:picLocks noGrp="1" noChangeAspect="1" noChangeArrowheads="1"/>
-          </p:cNvPicPr>
-          <p:nvPr>
-            <p:ph type="pic" sz="quarter" idx="11"/>
-          </p:nvPr>
-        </p:nvPicPr>
-        <p:blipFill rotWithShape="1">
-          <a:blip r:embed="rId3" cstate="screen">
-            <a:extLst>
-              <a:ext uri="{28A0092B-C50C-407E-A947-70E740481C1C}">
-                <a14:useLocalDpi xmlns="" xmlns:a14="http://schemas.microsoft.com/office/drawing/2010/main"/>
-              </a:ext>
-            </a:extLst>
-          </a:blip>
-          <a:srcRect l="10" r="10"/>
-          <a:stretch/>
-        </p:blipFill>
-        <p:spPr bwMode="auto">
-          <a:prstGeom prst="rect">
-            <a:avLst/>
-          </a:prstGeom>
-          <a:noFill/>
-          <a:ln>
-            <a:noFill/>
-          </a:ln>
-          <a:extLst>
-            <a:ext uri="{909E8E84-426E-40DD-AFC4-6F175D3DCCD1}">
-              <a14:hiddenFill xmlns="" xmlns:a14="http://schemas.microsoft.com/office/drawing/2010/main">
-                <a:solidFill>
-                  <a:srgbClr val="FFFFFF"/>
-                </a:solidFill>
-              </a14:hiddenFill>
-            </a:ext>
-          </a:extLst>
-        </p:spPr>
-      </p:pic>
+              <a:rPr lang="en-US" dirty="0" smtClean="0"/>
+              <a:t>Insert page title </a:t>
+            </a:r>
+            <a:endParaRPr lang="en-US" dirty="0"/>
+          </a:p>
+        </p:txBody>
+      </p:sp>
+      <p:sp>
+        <p:nvSpPr>
+          <p:cNvPr id="3" name="Text Placeholder 2"/>
+          <p:cNvSpPr>
+            <a:spLocks noGrp="1"/>
+          </p:cNvSpPr>
+          <p:nvPr>
+            <p:ph type="body" sz="quarter" idx="10"/>
+          </p:nvPr>
+        </p:nvSpPr>
+        <p:spPr/>
+        <p:txBody>
+          <a:bodyPr/>
+          <a:lstStyle/>
+          <a:p>
+            <a:pPr lvl="0"/>
+            <a:r>
+              <a:rPr lang="en-US" dirty="0" smtClean="0"/>
+              <a:t>First level</a:t>
+            </a:r>
+          </a:p>
+          <a:p>
+            <a:pPr lvl="1"/>
+            <a:r>
+              <a:rPr lang="en-US" dirty="0" smtClean="0"/>
+              <a:t>Java and OSGi, </a:t>
+            </a:r>
+            <a:r>
+              <a:rPr lang="en-US" dirty="0" err="1" smtClean="0"/>
+              <a:t>Git</a:t>
+            </a:r>
+            <a:r>
+              <a:rPr lang="en-US" dirty="0" smtClean="0"/>
+              <a:t>, Maven, </a:t>
+            </a:r>
+            <a:r>
+              <a:rPr lang="en-US" dirty="0" err="1" smtClean="0"/>
+              <a:t>MongoDB</a:t>
+            </a:r>
+            <a:endParaRPr lang="en-US" dirty="0" smtClean="0"/>
+          </a:p>
+          <a:p>
+            <a:pPr lvl="1"/>
+            <a:r>
+              <a:rPr lang="en-US" dirty="0" smtClean="0"/>
+              <a:t>Recording and Analyzing Real-World Data in Memory with Java</a:t>
+            </a:r>
+          </a:p>
+          <a:p>
+            <a:pPr lvl="0"/>
+            <a:endParaRPr lang="en-US" dirty="0" smtClean="0"/>
+          </a:p>
+          <a:p>
+            <a:pPr lvl="1"/>
+            <a:r>
+              <a:rPr lang="en-US" dirty="0" smtClean="0"/>
+              <a:t>Second level</a:t>
+            </a:r>
+          </a:p>
+          <a:p>
+            <a:pPr lvl="2"/>
+            <a:r>
+              <a:rPr lang="en-US" dirty="0" smtClean="0"/>
+              <a:t>Third level</a:t>
+            </a:r>
+          </a:p>
+        </p:txBody>
+      </p:sp>
     </p:spTree>
   </p:cSld>
   <p:clrMapOvr>
     <a:masterClrMapping/>
   </p:clrMapOvr>
+  <p:transition spd="med"/>
+  <p:timing>
+    <p:tnLst>
+      <p:par>
+        <p:cTn id="1" dur="indefinite" restart="never" nodeType="tmRoot"/>
+      </p:par>
+    </p:tnLst>
+  </p:timing>
 </p:sld>
 </file>
 
@@ -11719,12 +11725,12 @@
       </p:grpSpPr>
       <p:sp>
         <p:nvSpPr>
-          <p:cNvPr id="2" name="Title 1"/>
+          <p:cNvPr id="3" name="Title 2"/>
           <p:cNvSpPr>
             <a:spLocks noGrp="1"/>
           </p:cNvSpPr>
           <p:nvPr>
-            <p:ph type="title"/>
+            <p:ph type="ctrTitle"/>
           </p:nvPr>
         </p:nvSpPr>
         <p:spPr/>
@@ -11733,94 +11739,57 @@
           <a:lstStyle/>
           <a:p>
             <a:r>
-              <a:rPr lang="en-US" dirty="0" smtClean="0"/>
-              <a:t>Insert page title </a:t>
-            </a:r>
-            <a:endParaRPr lang="en-US" dirty="0"/>
-          </a:p>
-        </p:txBody>
-      </p:sp>
-      <p:sp>
-        <p:nvSpPr>
-          <p:cNvPr id="3" name="Text Placeholder 2"/>
-          <p:cNvSpPr>
-            <a:spLocks noGrp="1"/>
-          </p:cNvSpPr>
-          <p:nvPr>
-            <p:ph type="body" sz="quarter" idx="10"/>
-          </p:nvPr>
-        </p:nvSpPr>
-        <p:spPr/>
-        <p:txBody>
-          <a:bodyPr/>
-          <a:lstStyle/>
-          <a:p>
-            <a:pPr lvl="0"/>
-            <a:r>
-              <a:rPr lang="en-US" dirty="0" smtClean="0"/>
-              <a:t>First level</a:t>
-            </a:r>
-          </a:p>
-          <a:p>
-            <a:pPr lvl="1"/>
-            <a:r>
-              <a:rPr lang="en-US" dirty="0" smtClean="0"/>
-              <a:t>Java and OSGi, </a:t>
-            </a:r>
-            <a:r>
-              <a:rPr lang="en-US" dirty="0" err="1" smtClean="0"/>
-              <a:t>Git</a:t>
-            </a:r>
-            <a:r>
-              <a:rPr lang="en-US" dirty="0" smtClean="0"/>
-              <a:t>, Maven, </a:t>
-            </a:r>
-            <a:r>
-              <a:rPr lang="en-US" dirty="0" err="1" smtClean="0"/>
-              <a:t>MongoDB</a:t>
-            </a:r>
-            <a:endParaRPr lang="en-US" dirty="0" smtClean="0"/>
-          </a:p>
-          <a:p>
-            <a:pPr lvl="1"/>
-            <a:r>
-              <a:rPr lang="en-US" dirty="0" smtClean="0"/>
-              <a:t>Recording and Analyzing Real-World Data in Memory with Java</a:t>
-            </a:r>
-          </a:p>
-          <a:p>
-            <a:pPr lvl="0"/>
-            <a:endParaRPr lang="en-US" dirty="0" smtClean="0"/>
-          </a:p>
-          <a:p>
-            <a:pPr lvl="1"/>
-            <a:r>
-              <a:rPr lang="en-US" dirty="0" smtClean="0"/>
-              <a:t>Second level</a:t>
-            </a:r>
-          </a:p>
-          <a:p>
-            <a:pPr lvl="2"/>
-            <a:r>
-              <a:rPr lang="en-US" dirty="0" smtClean="0"/>
-              <a:t>Third level</a:t>
-            </a:r>
-          </a:p>
-        </p:txBody>
-      </p:sp>
+              <a:rPr lang="en-US" sz="3200" dirty="0" smtClean="0"/>
+              <a:t>Caching and Locking in a Highly Concurrent Environment</a:t>
+            </a:r>
+          </a:p>
+        </p:txBody>
+      </p:sp>
+      <p:pic>
+        <p:nvPicPr>
+          <p:cNvPr id="7" name="Picture 2" descr="C:\Users\d019534\AppData\Local\Microsoft\Windows\Temporary Internet Files\Content.IE5\M8B9MV8Z\273539_l_srgb_s_gl[1].jpg"/>
+          <p:cNvPicPr>
+            <a:picLocks noGrp="1" noChangeAspect="1" noChangeArrowheads="1"/>
+          </p:cNvPicPr>
+          <p:nvPr>
+            <p:ph type="pic" sz="quarter" idx="11"/>
+          </p:nvPr>
+        </p:nvPicPr>
+        <p:blipFill rotWithShape="1">
+          <a:blip r:embed="rId3" cstate="screen">
+            <a:extLst>
+              <a:ext uri="{28A0092B-C50C-407E-A947-70E740481C1C}">
+                <a14:useLocalDpi xmlns:a14="http://schemas.microsoft.com/office/drawing/2010/main" xmlns=""/>
+              </a:ext>
+            </a:extLst>
+          </a:blip>
+          <a:srcRect l="10" r="10"/>
+          <a:stretch/>
+        </p:blipFill>
+        <p:spPr bwMode="auto">
+          <a:prstGeom prst="rect">
+            <a:avLst/>
+          </a:prstGeom>
+          <a:noFill/>
+          <a:ln>
+            <a:noFill/>
+          </a:ln>
+          <a:extLst>
+            <a:ext uri="{909E8E84-426E-40DD-AFC4-6F175D3DCCD1}">
+              <a14:hiddenFill xmlns:a14="http://schemas.microsoft.com/office/drawing/2010/main" xmlns="">
+                <a:solidFill>
+                  <a:srgbClr val="FFFFFF"/>
+                </a:solidFill>
+              </a14:hiddenFill>
+            </a:ext>
+          </a:extLst>
+        </p:spPr>
+      </p:pic>
     </p:spTree>
   </p:cSld>
   <p:clrMapOvr>
     <a:masterClrMapping/>
   </p:clrMapOvr>
-  <p:transition spd="med"/>
-  <p:timing>
-    <p:tnLst>
-      <p:par>
-        <p:cTn id="1" dur="indefinite" restart="never" nodeType="tmRoot"/>
-      </p:par>
-    </p:tnLst>
-  </p:timing>
 </p:sld>
 </file>
 
@@ -11843,12 +11812,12 @@
       </p:grpSpPr>
       <p:sp>
         <p:nvSpPr>
-          <p:cNvPr id="3" name="Title 2"/>
+          <p:cNvPr id="2" name="Title 1"/>
           <p:cNvSpPr>
             <a:spLocks noGrp="1"/>
           </p:cNvSpPr>
           <p:nvPr>
-            <p:ph type="ctrTitle"/>
+            <p:ph type="title"/>
           </p:nvPr>
         </p:nvSpPr>
         <p:spPr/>
@@ -11857,57 +11826,94 @@
           <a:lstStyle/>
           <a:p>
             <a:r>
-              <a:rPr lang="en-US" sz="3200" dirty="0" smtClean="0"/>
-              <a:t>Scaling an In-Memory Architecture with Replication</a:t>
-            </a:r>
-          </a:p>
-        </p:txBody>
-      </p:sp>
-      <p:pic>
-        <p:nvPicPr>
-          <p:cNvPr id="7" name="Picture 2" descr="C:\Users\d019534\AppData\Local\Microsoft\Windows\Temporary Internet Files\Content.IE5\M8B9MV8Z\273539_l_srgb_s_gl[1].jpg"/>
-          <p:cNvPicPr>
-            <a:picLocks noGrp="1" noChangeAspect="1" noChangeArrowheads="1"/>
-          </p:cNvPicPr>
-          <p:nvPr>
-            <p:ph type="pic" sz="quarter" idx="11"/>
-          </p:nvPr>
-        </p:nvPicPr>
-        <p:blipFill rotWithShape="1">
-          <a:blip r:embed="rId3" cstate="screen">
-            <a:extLst>
-              <a:ext uri="{28A0092B-C50C-407E-A947-70E740481C1C}">
-                <a14:useLocalDpi xmlns="" xmlns:a14="http://schemas.microsoft.com/office/drawing/2010/main"/>
-              </a:ext>
-            </a:extLst>
-          </a:blip>
-          <a:srcRect l="10" r="10"/>
-          <a:stretch/>
-        </p:blipFill>
-        <p:spPr bwMode="auto">
-          <a:prstGeom prst="rect">
-            <a:avLst/>
-          </a:prstGeom>
-          <a:noFill/>
-          <a:ln>
-            <a:noFill/>
-          </a:ln>
-          <a:extLst>
-            <a:ext uri="{909E8E84-426E-40DD-AFC4-6F175D3DCCD1}">
-              <a14:hiddenFill xmlns="" xmlns:a14="http://schemas.microsoft.com/office/drawing/2010/main">
-                <a:solidFill>
-                  <a:srgbClr val="FFFFFF"/>
-                </a:solidFill>
-              </a14:hiddenFill>
-            </a:ext>
-          </a:extLst>
-        </p:spPr>
-      </p:pic>
+              <a:rPr lang="en-US" dirty="0" smtClean="0"/>
+              <a:t>Insert page title </a:t>
+            </a:r>
+            <a:endParaRPr lang="en-US" dirty="0"/>
+          </a:p>
+        </p:txBody>
+      </p:sp>
+      <p:sp>
+        <p:nvSpPr>
+          <p:cNvPr id="3" name="Text Placeholder 2"/>
+          <p:cNvSpPr>
+            <a:spLocks noGrp="1"/>
+          </p:cNvSpPr>
+          <p:nvPr>
+            <p:ph type="body" sz="quarter" idx="10"/>
+          </p:nvPr>
+        </p:nvSpPr>
+        <p:spPr/>
+        <p:txBody>
+          <a:bodyPr/>
+          <a:lstStyle/>
+          <a:p>
+            <a:pPr lvl="0"/>
+            <a:r>
+              <a:rPr lang="en-US" dirty="0" smtClean="0"/>
+              <a:t>First level</a:t>
+            </a:r>
+          </a:p>
+          <a:p>
+            <a:pPr lvl="1"/>
+            <a:r>
+              <a:rPr lang="en-US" dirty="0" smtClean="0"/>
+              <a:t>Java and OSGi, </a:t>
+            </a:r>
+            <a:r>
+              <a:rPr lang="en-US" dirty="0" err="1" smtClean="0"/>
+              <a:t>Git</a:t>
+            </a:r>
+            <a:r>
+              <a:rPr lang="en-US" dirty="0" smtClean="0"/>
+              <a:t>, Maven, </a:t>
+            </a:r>
+            <a:r>
+              <a:rPr lang="en-US" dirty="0" err="1" smtClean="0"/>
+              <a:t>MongoDB</a:t>
+            </a:r>
+            <a:endParaRPr lang="en-US" dirty="0" smtClean="0"/>
+          </a:p>
+          <a:p>
+            <a:pPr lvl="1"/>
+            <a:r>
+              <a:rPr lang="en-US" dirty="0" smtClean="0"/>
+              <a:t>Recording and Analyzing Real-World Data in Memory with Java</a:t>
+            </a:r>
+          </a:p>
+          <a:p>
+            <a:pPr lvl="0"/>
+            <a:endParaRPr lang="en-US" dirty="0" smtClean="0"/>
+          </a:p>
+          <a:p>
+            <a:pPr lvl="1"/>
+            <a:r>
+              <a:rPr lang="en-US" dirty="0" smtClean="0"/>
+              <a:t>Second level</a:t>
+            </a:r>
+          </a:p>
+          <a:p>
+            <a:pPr lvl="2"/>
+            <a:r>
+              <a:rPr lang="en-US" dirty="0" smtClean="0"/>
+              <a:t>Third level</a:t>
+            </a:r>
+          </a:p>
+        </p:txBody>
+      </p:sp>
     </p:spTree>
   </p:cSld>
   <p:clrMapOvr>
     <a:masterClrMapping/>
   </p:clrMapOvr>
+  <p:transition spd="med"/>
+  <p:timing>
+    <p:tnLst>
+      <p:par>
+        <p:cTn id="1" dur="indefinite" restart="never" nodeType="tmRoot"/>
+      </p:par>
+    </p:tnLst>
+  </p:timing>
 </p:sld>
 </file>
 
@@ -11930,12 +11936,12 @@
       </p:grpSpPr>
       <p:sp>
         <p:nvSpPr>
-          <p:cNvPr id="2" name="Title 1"/>
+          <p:cNvPr id="3" name="Title 2"/>
           <p:cNvSpPr>
             <a:spLocks noGrp="1"/>
           </p:cNvSpPr>
           <p:nvPr>
-            <p:ph type="title"/>
+            <p:ph type="ctrTitle"/>
           </p:nvPr>
         </p:nvSpPr>
         <p:spPr/>
@@ -11944,70 +11950,57 @@
           <a:lstStyle/>
           <a:p>
             <a:r>
-              <a:rPr lang="en-US" dirty="0" smtClean="0"/>
-              <a:t>Insert page title</a:t>
-            </a:r>
-            <a:br>
-              <a:rPr lang="en-US" dirty="0" smtClean="0"/>
-            </a:br>
-            <a:r>
-              <a:rPr lang="en-US" sz="2000" b="0" dirty="0" smtClean="0"/>
-              <a:t>Subtitle </a:t>
-            </a:r>
-            <a:endParaRPr lang="en-US" sz="2000" b="0" dirty="0"/>
-          </a:p>
-        </p:txBody>
-      </p:sp>
-      <p:sp>
-        <p:nvSpPr>
-          <p:cNvPr id="3" name="Text Placeholder 2"/>
-          <p:cNvSpPr>
-            <a:spLocks noGrp="1"/>
-          </p:cNvSpPr>
-          <p:nvPr>
-            <p:ph type="body" sz="quarter" idx="10"/>
-          </p:nvPr>
-        </p:nvSpPr>
-        <p:spPr/>
-        <p:txBody>
-          <a:bodyPr/>
-          <a:lstStyle/>
-          <a:p>
-            <a:pPr lvl="0"/>
-            <a:r>
-              <a:rPr lang="en-US" dirty="0" smtClean="0"/>
-              <a:t>First level</a:t>
-            </a:r>
-          </a:p>
-          <a:p>
-            <a:pPr lvl="1"/>
-            <a:r>
-              <a:rPr lang="en-US" dirty="0" smtClean="0"/>
-              <a:t>Second level</a:t>
-            </a:r>
-          </a:p>
-          <a:p>
-            <a:pPr lvl="2"/>
-            <a:r>
-              <a:rPr lang="en-US" dirty="0" smtClean="0"/>
-              <a:t>Third level</a:t>
-            </a:r>
-          </a:p>
-        </p:txBody>
-      </p:sp>
+              <a:rPr lang="en-US" sz="3200" dirty="0" smtClean="0"/>
+              <a:t>Scaling an In-Memory Architecture with Replication</a:t>
+            </a:r>
+          </a:p>
+        </p:txBody>
+      </p:sp>
+      <p:pic>
+        <p:nvPicPr>
+          <p:cNvPr id="7" name="Picture 2" descr="C:\Users\d019534\AppData\Local\Microsoft\Windows\Temporary Internet Files\Content.IE5\M8B9MV8Z\273539_l_srgb_s_gl[1].jpg"/>
+          <p:cNvPicPr>
+            <a:picLocks noGrp="1" noChangeAspect="1" noChangeArrowheads="1"/>
+          </p:cNvPicPr>
+          <p:nvPr>
+            <p:ph type="pic" sz="quarter" idx="11"/>
+          </p:nvPr>
+        </p:nvPicPr>
+        <p:blipFill rotWithShape="1">
+          <a:blip r:embed="rId3" cstate="screen">
+            <a:extLst>
+              <a:ext uri="{28A0092B-C50C-407E-A947-70E740481C1C}">
+                <a14:useLocalDpi xmlns:a14="http://schemas.microsoft.com/office/drawing/2010/main" xmlns=""/>
+              </a:ext>
+            </a:extLst>
+          </a:blip>
+          <a:srcRect l="10" r="10"/>
+          <a:stretch/>
+        </p:blipFill>
+        <p:spPr bwMode="auto">
+          <a:prstGeom prst="rect">
+            <a:avLst/>
+          </a:prstGeom>
+          <a:noFill/>
+          <a:ln>
+            <a:noFill/>
+          </a:ln>
+          <a:extLst>
+            <a:ext uri="{909E8E84-426E-40DD-AFC4-6F175D3DCCD1}">
+              <a14:hiddenFill xmlns:a14="http://schemas.microsoft.com/office/drawing/2010/main" xmlns="">
+                <a:solidFill>
+                  <a:srgbClr val="FFFFFF"/>
+                </a:solidFill>
+              </a14:hiddenFill>
+            </a:ext>
+          </a:extLst>
+        </p:spPr>
+      </p:pic>
     </p:spTree>
   </p:cSld>
   <p:clrMapOvr>
     <a:masterClrMapping/>
   </p:clrMapOvr>
-  <p:transition spd="med"/>
-  <p:timing>
-    <p:tnLst>
-      <p:par>
-        <p:cTn id="1" dur="indefinite" restart="never" nodeType="tmRoot"/>
-      </p:par>
-    </p:tnLst>
-  </p:timing>
 </p:sld>
 </file>
 
@@ -12030,12 +12023,12 @@
       </p:grpSpPr>
       <p:sp>
         <p:nvSpPr>
-          <p:cNvPr id="3" name="Title 2"/>
+          <p:cNvPr id="2" name="Title 1"/>
           <p:cNvSpPr>
             <a:spLocks noGrp="1"/>
           </p:cNvSpPr>
           <p:nvPr>
-            <p:ph type="ctrTitle"/>
+            <p:ph type="title"/>
           </p:nvPr>
         </p:nvSpPr>
         <p:spPr/>
@@ -12044,57 +12037,70 @@
           <a:lstStyle/>
           <a:p>
             <a:r>
-              <a:rPr lang="en-US" sz="3200" dirty="0" smtClean="0"/>
-              <a:t>Open Issues, Outlook</a:t>
-            </a:r>
-          </a:p>
-        </p:txBody>
-      </p:sp>
-      <p:pic>
-        <p:nvPicPr>
-          <p:cNvPr id="7" name="Picture 2" descr="C:\Users\d019534\AppData\Local\Microsoft\Windows\Temporary Internet Files\Content.IE5\M8B9MV8Z\273539_l_srgb_s_gl[1].jpg"/>
-          <p:cNvPicPr>
-            <a:picLocks noGrp="1" noChangeAspect="1" noChangeArrowheads="1"/>
-          </p:cNvPicPr>
-          <p:nvPr>
-            <p:ph type="pic" sz="quarter" idx="11"/>
-          </p:nvPr>
-        </p:nvPicPr>
-        <p:blipFill rotWithShape="1">
-          <a:blip r:embed="rId3" cstate="screen">
-            <a:extLst>
-              <a:ext uri="{28A0092B-C50C-407E-A947-70E740481C1C}">
-                <a14:useLocalDpi xmlns="" xmlns:a14="http://schemas.microsoft.com/office/drawing/2010/main"/>
-              </a:ext>
-            </a:extLst>
-          </a:blip>
-          <a:srcRect l="10" r="10"/>
-          <a:stretch/>
-        </p:blipFill>
-        <p:spPr bwMode="auto">
-          <a:prstGeom prst="rect">
-            <a:avLst/>
-          </a:prstGeom>
-          <a:noFill/>
-          <a:ln>
-            <a:noFill/>
-          </a:ln>
-          <a:extLst>
-            <a:ext uri="{909E8E84-426E-40DD-AFC4-6F175D3DCCD1}">
-              <a14:hiddenFill xmlns="" xmlns:a14="http://schemas.microsoft.com/office/drawing/2010/main">
-                <a:solidFill>
-                  <a:srgbClr val="FFFFFF"/>
-                </a:solidFill>
-              </a14:hiddenFill>
-            </a:ext>
-          </a:extLst>
-        </p:spPr>
-      </p:pic>
+              <a:rPr lang="en-US" dirty="0" smtClean="0"/>
+              <a:t>Insert page title</a:t>
+            </a:r>
+            <a:br>
+              <a:rPr lang="en-US" dirty="0" smtClean="0"/>
+            </a:br>
+            <a:r>
+              <a:rPr lang="en-US" sz="2000" b="0" dirty="0" smtClean="0"/>
+              <a:t>Subtitle </a:t>
+            </a:r>
+            <a:endParaRPr lang="en-US" sz="2000" b="0" dirty="0"/>
+          </a:p>
+        </p:txBody>
+      </p:sp>
+      <p:sp>
+        <p:nvSpPr>
+          <p:cNvPr id="3" name="Text Placeholder 2"/>
+          <p:cNvSpPr>
+            <a:spLocks noGrp="1"/>
+          </p:cNvSpPr>
+          <p:nvPr>
+            <p:ph type="body" sz="quarter" idx="10"/>
+          </p:nvPr>
+        </p:nvSpPr>
+        <p:spPr/>
+        <p:txBody>
+          <a:bodyPr/>
+          <a:lstStyle/>
+          <a:p>
+            <a:pPr lvl="0"/>
+            <a:r>
+              <a:rPr lang="en-US" dirty="0" smtClean="0"/>
+              <a:t>First level</a:t>
+            </a:r>
+          </a:p>
+          <a:p>
+            <a:pPr lvl="1"/>
+            <a:r>
+              <a:rPr lang="en-US" dirty="0" smtClean="0"/>
+              <a:t>Second level</a:t>
+            </a:r>
+          </a:p>
+          <a:p>
+            <a:pPr lvl="2"/>
+            <a:r>
+              <a:rPr lang="en-US" dirty="0" smtClean="0"/>
+              <a:t>Third level</a:t>
+            </a:r>
+          </a:p>
+        </p:txBody>
+      </p:sp>
     </p:spTree>
   </p:cSld>
   <p:clrMapOvr>
     <a:masterClrMapping/>
   </p:clrMapOvr>
+  <p:transition spd="med"/>
+  <p:timing>
+    <p:tnLst>
+      <p:par>
+        <p:cTn id="1" dur="indefinite" restart="never" nodeType="tmRoot"/>
+      </p:par>
+    </p:tnLst>
+  </p:timing>
 </p:sld>
 </file>
 
@@ -12132,34 +12138,49 @@
           <a:p>
             <a:r>
               <a:rPr lang="en-US" sz="3200" dirty="0" smtClean="0"/>
-              <a:t>Questions?</a:t>
-            </a:r>
-            <a:endParaRPr lang="en-US" sz="3200" dirty="0" smtClean="0"/>
+              <a:t>Open Issues, Outlook</a:t>
+            </a:r>
           </a:p>
         </p:txBody>
       </p:sp>
       <p:pic>
         <p:nvPicPr>
-          <p:cNvPr id="5" name="Picture Placeholder 4" descr="1024x682-IMG_1545.JPG"/>
+          <p:cNvPr id="7" name="Picture 2" descr="C:\Users\d019534\AppData\Local\Microsoft\Windows\Temporary Internet Files\Content.IE5\M8B9MV8Z\273539_l_srgb_s_gl[1].jpg"/>
           <p:cNvPicPr>
-            <a:picLocks noGrp="1" noChangeAspect="1"/>
+            <a:picLocks noGrp="1" noChangeAspect="1" noChangeArrowheads="1"/>
           </p:cNvPicPr>
           <p:nvPr>
             <p:ph type="pic" sz="quarter" idx="11"/>
           </p:nvPr>
         </p:nvPicPr>
-        <p:blipFill>
-          <a:blip r:embed="rId3" cstate="print"/>
-          <a:srcRect t="51562" b="30938"/>
-          <a:stretch>
-            <a:fillRect/>
-          </a:stretch>
+        <p:blipFill rotWithShape="1">
+          <a:blip r:embed="rId3" cstate="screen">
+            <a:extLst>
+              <a:ext uri="{28A0092B-C50C-407E-A947-70E740481C1C}">
+                <a14:useLocalDpi xmlns:a14="http://schemas.microsoft.com/office/drawing/2010/main" xmlns=""/>
+              </a:ext>
+            </a:extLst>
+          </a:blip>
+          <a:srcRect l="10" r="10"/>
+          <a:stretch/>
         </p:blipFill>
-        <p:spPr>
-          <a:xfrm>
-            <a:off x="324000" y="161459"/>
-            <a:ext cx="8496000" cy="2232025"/>
-          </a:xfrm>
+        <p:spPr bwMode="auto">
+          <a:prstGeom prst="rect">
+            <a:avLst/>
+          </a:prstGeom>
+          <a:noFill/>
+          <a:ln>
+            <a:noFill/>
+          </a:ln>
+          <a:extLst>
+            <a:ext uri="{909E8E84-426E-40DD-AFC4-6F175D3DCCD1}">
+              <a14:hiddenFill xmlns:a14="http://schemas.microsoft.com/office/drawing/2010/main" xmlns="">
+                <a:solidFill>
+                  <a:srgbClr val="FFFFFF"/>
+                </a:solidFill>
+              </a14:hiddenFill>
+            </a:ext>
+          </a:extLst>
         </p:spPr>
       </p:pic>
     </p:spTree>
@@ -12189,12 +12210,12 @@
       </p:grpSpPr>
       <p:sp>
         <p:nvSpPr>
-          <p:cNvPr id="2" name="Title 1"/>
+          <p:cNvPr id="3" name="Title 2"/>
           <p:cNvSpPr>
             <a:spLocks noGrp="1"/>
           </p:cNvSpPr>
           <p:nvPr>
-            <p:ph type="title"/>
+            <p:ph type="ctrTitle"/>
           </p:nvPr>
         </p:nvSpPr>
         <p:spPr/>
@@ -12203,76 +12224,41 @@
           <a:lstStyle/>
           <a:p>
             <a:r>
-              <a:rPr lang="en-US" dirty="0" smtClean="0"/>
-              <a:t>Insert page title </a:t>
-            </a:r>
-            <a:endParaRPr lang="en-US" dirty="0"/>
-          </a:p>
-        </p:txBody>
-      </p:sp>
-      <p:sp>
-        <p:nvSpPr>
-          <p:cNvPr id="4" name="Text Placeholder 3"/>
-          <p:cNvSpPr>
-            <a:spLocks noGrp="1"/>
-          </p:cNvSpPr>
-          <p:nvPr>
-            <p:ph type="body" sz="quarter" idx="11"/>
-          </p:nvPr>
-        </p:nvSpPr>
-        <p:spPr/>
-        <p:txBody>
-          <a:bodyPr/>
-          <a:lstStyle/>
-          <a:p>
-            <a:pPr lvl="0"/>
-            <a:r>
-              <a:rPr lang="en-US" dirty="0" smtClean="0"/>
-              <a:t>First level</a:t>
-            </a:r>
-          </a:p>
-          <a:p>
-            <a:pPr lvl="1"/>
-            <a:r>
-              <a:rPr lang="en-US" dirty="0" smtClean="0"/>
-              <a:t>Second level</a:t>
-            </a:r>
-          </a:p>
-          <a:p>
-            <a:pPr lvl="2"/>
-            <a:r>
-              <a:rPr lang="en-US" dirty="0" smtClean="0"/>
-              <a:t>Third level</a:t>
-            </a:r>
-            <a:endParaRPr lang="en-US" dirty="0"/>
-          </a:p>
-        </p:txBody>
-      </p:sp>
-      <p:sp>
-        <p:nvSpPr>
-          <p:cNvPr id="5" name="Picture Placeholder 4"/>
-          <p:cNvSpPr>
-            <a:spLocks noGrp="1"/>
-          </p:cNvSpPr>
-          <p:nvPr>
-            <p:ph type="pic" sz="quarter" idx="10"/>
-          </p:nvPr>
-        </p:nvSpPr>
-        <p:spPr/>
-      </p:sp>
+              <a:rPr lang="en-US" sz="3200" dirty="0" smtClean="0"/>
+              <a:t>Questions?</a:t>
+            </a:r>
+          </a:p>
+        </p:txBody>
+      </p:sp>
+      <p:pic>
+        <p:nvPicPr>
+          <p:cNvPr id="5" name="Picture Placeholder 4" descr="1024x682-IMG_1545.JPG"/>
+          <p:cNvPicPr>
+            <a:picLocks noGrp="1" noChangeAspect="1"/>
+          </p:cNvPicPr>
+          <p:nvPr>
+            <p:ph type="pic" sz="quarter" idx="11"/>
+          </p:nvPr>
+        </p:nvPicPr>
+        <p:blipFill>
+          <a:blip r:embed="rId3" cstate="print"/>
+          <a:srcRect t="51562" b="30938"/>
+          <a:stretch>
+            <a:fillRect/>
+          </a:stretch>
+        </p:blipFill>
+        <p:spPr>
+          <a:xfrm>
+            <a:off x="324000" y="161459"/>
+            <a:ext cx="8496000" cy="2232025"/>
+          </a:xfrm>
+        </p:spPr>
+      </p:pic>
     </p:spTree>
   </p:cSld>
   <p:clrMapOvr>
     <a:masterClrMapping/>
   </p:clrMapOvr>
-  <p:transition spd="med"/>
-  <p:timing>
-    <p:tnLst>
-      <p:par>
-        <p:cTn id="1" dur="indefinite" restart="never" nodeType="tmRoot"/>
-      </p:par>
-    </p:tnLst>
-  </p:timing>
 </p:sld>
 </file>
 
@@ -12329,7 +12315,7 @@
           <a:blip r:embed="rId3" cstate="screen">
             <a:extLst>
               <a:ext uri="{28A0092B-C50C-407E-A947-70E740481C1C}">
-                <a14:useLocalDpi xmlns="" xmlns:a14="http://schemas.microsoft.com/office/drawing/2010/main"/>
+                <a14:useLocalDpi xmlns:a14="http://schemas.microsoft.com/office/drawing/2010/main" xmlns=""/>
               </a:ext>
             </a:extLst>
           </a:blip>
@@ -12346,7 +12332,7 @@
           </a:ln>
           <a:extLst>
             <a:ext uri="{909E8E84-426E-40DD-AFC4-6F175D3DCCD1}">
-              <a14:hiddenFill xmlns="" xmlns:a14="http://schemas.microsoft.com/office/drawing/2010/main">
+              <a14:hiddenFill xmlns:a14="http://schemas.microsoft.com/office/drawing/2010/main" xmlns="">
                 <a:solidFill>
                   <a:srgbClr val="FFFFFF"/>
                 </a:solidFill>
@@ -12382,6 +12368,112 @@
       </p:grpSpPr>
       <p:sp>
         <p:nvSpPr>
+          <p:cNvPr id="2" name="Title 1"/>
+          <p:cNvSpPr>
+            <a:spLocks noGrp="1"/>
+          </p:cNvSpPr>
+          <p:nvPr>
+            <p:ph type="title"/>
+          </p:nvPr>
+        </p:nvSpPr>
+        <p:spPr/>
+        <p:txBody>
+          <a:bodyPr/>
+          <a:lstStyle/>
+          <a:p>
+            <a:r>
+              <a:rPr lang="en-US" dirty="0" smtClean="0"/>
+              <a:t>Insert page title </a:t>
+            </a:r>
+            <a:endParaRPr lang="en-US" dirty="0"/>
+          </a:p>
+        </p:txBody>
+      </p:sp>
+      <p:sp>
+        <p:nvSpPr>
+          <p:cNvPr id="4" name="Text Placeholder 3"/>
+          <p:cNvSpPr>
+            <a:spLocks noGrp="1"/>
+          </p:cNvSpPr>
+          <p:nvPr>
+            <p:ph type="body" sz="quarter" idx="11"/>
+          </p:nvPr>
+        </p:nvSpPr>
+        <p:spPr/>
+        <p:txBody>
+          <a:bodyPr/>
+          <a:lstStyle/>
+          <a:p>
+            <a:pPr lvl="0"/>
+            <a:r>
+              <a:rPr lang="en-US" dirty="0" smtClean="0"/>
+              <a:t>First level</a:t>
+            </a:r>
+          </a:p>
+          <a:p>
+            <a:pPr lvl="1"/>
+            <a:r>
+              <a:rPr lang="en-US" dirty="0" smtClean="0"/>
+              <a:t>Second level</a:t>
+            </a:r>
+          </a:p>
+          <a:p>
+            <a:pPr lvl="2"/>
+            <a:r>
+              <a:rPr lang="en-US" dirty="0" smtClean="0"/>
+              <a:t>Third level</a:t>
+            </a:r>
+            <a:endParaRPr lang="en-US" dirty="0"/>
+          </a:p>
+        </p:txBody>
+      </p:sp>
+      <p:sp>
+        <p:nvSpPr>
+          <p:cNvPr id="5" name="Picture Placeholder 4"/>
+          <p:cNvSpPr>
+            <a:spLocks noGrp="1"/>
+          </p:cNvSpPr>
+          <p:nvPr>
+            <p:ph type="pic" sz="quarter" idx="10"/>
+          </p:nvPr>
+        </p:nvSpPr>
+        <p:spPr/>
+      </p:sp>
+    </p:spTree>
+  </p:cSld>
+  <p:clrMapOvr>
+    <a:masterClrMapping/>
+  </p:clrMapOvr>
+  <p:transition spd="med"/>
+  <p:timing>
+    <p:tnLst>
+      <p:par>
+        <p:cTn id="1" dur="indefinite" restart="never" nodeType="tmRoot"/>
+      </p:par>
+    </p:tnLst>
+  </p:timing>
+</p:sld>
+</file>
+
+<file path=ppt/slides/slide31.xml><?xml version="1.0" encoding="utf-8"?>
+<p:sld xmlns:a="http://schemas.openxmlformats.org/drawingml/2006/main" xmlns:r="http://schemas.openxmlformats.org/officeDocument/2006/relationships" xmlns:p="http://schemas.openxmlformats.org/presentationml/2006/main">
+  <p:cSld>
+    <p:spTree>
+      <p:nvGrpSpPr>
+        <p:cNvPr id="1" name=""/>
+        <p:cNvGrpSpPr/>
+        <p:nvPr/>
+      </p:nvGrpSpPr>
+      <p:grpSpPr>
+        <a:xfrm>
+          <a:off x="0" y="0"/>
+          <a:ext cx="0" cy="0"/>
+          <a:chOff x="0" y="0"/>
+          <a:chExt cx="0" cy="0"/>
+        </a:xfrm>
+      </p:grpSpPr>
+      <p:sp>
+        <p:nvSpPr>
           <p:cNvPr id="5" name="Title 4"/>
           <p:cNvSpPr>
             <a:spLocks noGrp="1"/>
@@ -12495,7 +12587,7 @@
 </p:sld>
 </file>
 
-<file path=ppt/slides/slide31.xml><?xml version="1.0" encoding="utf-8"?>
+<file path=ppt/slides/slide32.xml><?xml version="1.0" encoding="utf-8"?>
 <p:sld xmlns:a="http://schemas.openxmlformats.org/drawingml/2006/main" xmlns:r="http://schemas.openxmlformats.org/officeDocument/2006/relationships" xmlns:p="http://schemas.openxmlformats.org/presentationml/2006/main" show="0">
   <p:cSld>
     <p:spTree>
@@ -12528,7 +12620,7 @@
 </p:sld>
 </file>
 
-<file path=ppt/slides/slide32.xml><?xml version="1.0" encoding="utf-8"?>
+<file path=ppt/slides/slide33.xml><?xml version="1.0" encoding="utf-8"?>
 <p:sld xmlns:a="http://schemas.openxmlformats.org/drawingml/2006/main" xmlns:r="http://schemas.openxmlformats.org/officeDocument/2006/relationships" xmlns:p="http://schemas.openxmlformats.org/presentationml/2006/main" show="0">
   <p:cSld>
     <p:spTree>
@@ -13074,7 +13166,7 @@
     <a:masterClrMapping/>
   </p:clrMapOvr>
   <mc:AlternateContent xmlns:mc="http://schemas.openxmlformats.org/markup-compatibility/2006">
-    <mc:Choice xmlns:p14="http://schemas.microsoft.com/office/powerpoint/2010/main" xmlns="" Requires="p14">
+    <mc:Choice xmlns="" xmlns:p14="http://schemas.microsoft.com/office/powerpoint/2010/main" Requires="p14">
       <p:transition spd="med" p14:dur="700">
         <p:fade/>
       </p:transition>
@@ -13256,7 +13348,7 @@
     </p:spTree>
     <p:extLst>
       <p:ext uri="{BB962C8B-B14F-4D97-AF65-F5344CB8AC3E}">
-        <p14:creationId xmlns:p14="http://schemas.microsoft.com/office/powerpoint/2010/main" xmlns="" val="4247444032"/>
+        <p14:creationId xmlns="" xmlns:p14="http://schemas.microsoft.com/office/powerpoint/2010/main" val="4247444032"/>
       </p:ext>
     </p:extLst>
   </p:cSld>
@@ -13264,7 +13356,7 @@
     <a:masterClrMapping/>
   </p:clrMapOvr>
   <mc:AlternateContent xmlns:mc="http://schemas.openxmlformats.org/markup-compatibility/2006">
-    <mc:Choice xmlns:p14="http://schemas.microsoft.com/office/powerpoint/2010/main" xmlns="" Requires="p14">
+    <mc:Choice xmlns="" xmlns:p14="http://schemas.microsoft.com/office/powerpoint/2010/main" Requires="p14">
       <p:transition spd="med" p14:dur="700">
         <p:fade/>
       </p:transition>
@@ -13364,7 +13456,7 @@
     <a:masterClrMapping/>
   </p:clrMapOvr>
   <mc:AlternateContent xmlns:mc="http://schemas.openxmlformats.org/markup-compatibility/2006">
-    <mc:Choice xmlns:p14="http://schemas.microsoft.com/office/powerpoint/2010/main" xmlns="" Requires="p14">
+    <mc:Choice xmlns="" xmlns:p14="http://schemas.microsoft.com/office/powerpoint/2010/main" Requires="p14">
       <p:transition spd="med" p14:dur="700">
         <p:fade/>
       </p:transition>

</xml_diff>

<commit_message>
fixed competitor ID problem for SwissTiming; pesistence layer assumed it could put a Serializable ID into a DBObject which is not the case;
More generally, this raises the question where else we rely on Serializable going into MongoDB. Opened bug 1311
</commit_message>
<xml_diff>
--- a/doc/SAPSailingAnalyticsArchitecture.pptx
+++ b/doc/SAPSailingAnalyticsArchitecture.pptx
@@ -29,9 +29,9 @@
     <p:sldId id="367" r:id="rId17"/>
     <p:sldId id="348" r:id="rId18"/>
     <p:sldId id="349" r:id="rId19"/>
-    <p:sldId id="356" r:id="rId20"/>
-    <p:sldId id="357" r:id="rId21"/>
-    <p:sldId id="368" r:id="rId22"/>
+    <p:sldId id="368" r:id="rId20"/>
+    <p:sldId id="356" r:id="rId21"/>
+    <p:sldId id="357" r:id="rId22"/>
     <p:sldId id="350" r:id="rId23"/>
     <p:sldId id="351" r:id="rId24"/>
     <p:sldId id="352" r:id="rId25"/>
@@ -647,7 +647,7 @@
             <a:fld id="{7D8C2C35-2B8A-446E-BEC0-FD36716C29AC}" type="slidenum">
               <a:rPr lang="de-DE" smtClean="0"/>
               <a:pPr/>
-              <a:t>19</a:t>
+              <a:t>20</a:t>
             </a:fld>
             <a:endParaRPr lang="de-DE" dirty="0"/>
           </a:p>
@@ -729,7 +729,7 @@
             <a:fld id="{7D8C2C35-2B8A-446E-BEC0-FD36716C29AC}" type="slidenum">
               <a:rPr lang="de-DE" smtClean="0"/>
               <a:pPr/>
-              <a:t>20</a:t>
+              <a:t>21</a:t>
             </a:fld>
             <a:endParaRPr lang="de-DE" dirty="0"/>
           </a:p>
@@ -10115,7 +10115,7 @@
       </p:sp>
       <p:pic>
         <p:nvPicPr>
-          <p:cNvPr id="1030" name="Picture 6"/>
+          <p:cNvPr id="1027" name="Picture 3"/>
           <p:cNvPicPr>
             <a:picLocks noChangeAspect="1" noChangeArrowheads="1"/>
           </p:cNvPicPr>
@@ -10130,8 +10130,8 @@
         </p:blipFill>
         <p:spPr bwMode="auto">
           <a:xfrm>
-            <a:off x="152400" y="1100138"/>
-            <a:ext cx="8799513" cy="5638800"/>
+            <a:off x="65515" y="1069843"/>
+            <a:ext cx="8680450" cy="5440362"/>
           </a:xfrm>
           <a:prstGeom prst="rect">
             <a:avLst/>
@@ -10727,174 +10727,43 @@
           <a:p>
             <a:r>
               <a:rPr lang="en-US" dirty="0" smtClean="0"/>
-              <a:t>Insert page title </a:t>
+              <a:t>Leaderboard as Re-Built with GWT</a:t>
             </a:r>
             <a:endParaRPr lang="en-US" dirty="0"/>
-          </a:p>
-        </p:txBody>
-      </p:sp>
-      <p:sp>
-        <p:nvSpPr>
-          <p:cNvPr id="3" name="Text Placeholder 2"/>
-          <p:cNvSpPr>
-            <a:spLocks noGrp="1"/>
-          </p:cNvSpPr>
-          <p:nvPr>
-            <p:ph type="body" sz="quarter" idx="10"/>
-          </p:nvPr>
-        </p:nvSpPr>
-        <p:spPr/>
-        <p:txBody>
-          <a:bodyPr/>
-          <a:lstStyle/>
-          <a:p>
-            <a:pPr lvl="0"/>
-            <a:r>
-              <a:rPr lang="en-US" dirty="0" smtClean="0"/>
-              <a:t>First level</a:t>
-            </a:r>
-          </a:p>
-          <a:p>
-            <a:pPr lvl="1"/>
-            <a:r>
-              <a:rPr lang="en-US" dirty="0" smtClean="0"/>
-              <a:t>Java and OSGi, </a:t>
-            </a:r>
-            <a:r>
-              <a:rPr lang="en-US" dirty="0" err="1" smtClean="0"/>
-              <a:t>Git</a:t>
-            </a:r>
-            <a:r>
-              <a:rPr lang="en-US" dirty="0" smtClean="0"/>
-              <a:t>, Maven, </a:t>
-            </a:r>
-            <a:r>
-              <a:rPr lang="en-US" dirty="0" err="1" smtClean="0"/>
-              <a:t>MongoDB</a:t>
-            </a:r>
-            <a:endParaRPr lang="en-US" dirty="0" smtClean="0"/>
-          </a:p>
-          <a:p>
-            <a:pPr lvl="1"/>
-            <a:r>
-              <a:rPr lang="en-US" dirty="0" smtClean="0"/>
-              <a:t>Recording and Analyzing Real-World Data in Memory with Java</a:t>
-            </a:r>
-          </a:p>
-          <a:p>
-            <a:pPr lvl="0"/>
-            <a:endParaRPr lang="en-US" dirty="0" smtClean="0"/>
-          </a:p>
-          <a:p>
-            <a:pPr lvl="1"/>
-            <a:r>
-              <a:rPr lang="en-US" dirty="0" smtClean="0"/>
-              <a:t>Second level</a:t>
-            </a:r>
-          </a:p>
-          <a:p>
-            <a:pPr lvl="2"/>
-            <a:r>
-              <a:rPr lang="en-US" dirty="0" smtClean="0"/>
-              <a:t>Third level</a:t>
-            </a:r>
           </a:p>
         </p:txBody>
       </p:sp>
       <p:pic>
         <p:nvPicPr>
-          <p:cNvPr id="4" name="Picture 3" descr="640x426-IMG_6645.JPG"/>
+          <p:cNvPr id="2051" name="Picture 3"/>
           <p:cNvPicPr>
-            <a:picLocks noChangeAspect="1"/>
+            <a:picLocks noChangeAspect="1" noChangeArrowheads="1"/>
           </p:cNvPicPr>
           <p:nvPr/>
         </p:nvPicPr>
         <p:blipFill>
-          <a:blip r:embed="rId3" cstate="print"/>
+          <a:blip r:embed="rId2" cstate="print"/>
+          <a:srcRect/>
           <a:stretch>
             <a:fillRect/>
           </a:stretch>
         </p:blipFill>
-        <p:spPr>
+        <p:spPr bwMode="auto">
           <a:xfrm>
-            <a:off x="6867525" y="1365250"/>
-            <a:ext cx="1842849" cy="2768600"/>
+            <a:off x="613158" y="1315567"/>
+            <a:ext cx="7958085" cy="4864552"/>
           </a:xfrm>
           <a:prstGeom prst="rect">
             <a:avLst/>
           </a:prstGeom>
-        </p:spPr>
-      </p:pic>
-      <p:pic>
-        <p:nvPicPr>
-          <p:cNvPr id="7" name="Picture 6" descr="640x426-IMG_6636.JPG"/>
-          <p:cNvPicPr>
-            <a:picLocks noChangeAspect="1"/>
-          </p:cNvPicPr>
-          <p:nvPr/>
-        </p:nvPicPr>
-        <p:blipFill>
-          <a:blip r:embed="rId4" cstate="print"/>
-          <a:stretch>
-            <a:fillRect/>
-          </a:stretch>
-        </p:blipFill>
-        <p:spPr>
-          <a:xfrm>
-            <a:off x="6235700" y="4718050"/>
-            <a:ext cx="1683792" cy="1120774"/>
-          </a:xfrm>
-          <a:prstGeom prst="rect">
-            <a:avLst/>
-          </a:prstGeom>
-        </p:spPr>
-      </p:pic>
-      <p:pic>
-        <p:nvPicPr>
-          <p:cNvPr id="8" name="Picture 7" descr="640x426-IMG_6760.JPG"/>
-          <p:cNvPicPr>
-            <a:picLocks noChangeAspect="1"/>
-          </p:cNvPicPr>
-          <p:nvPr/>
-        </p:nvPicPr>
-        <p:blipFill>
-          <a:blip r:embed="rId5" cstate="print"/>
-          <a:stretch>
-            <a:fillRect/>
-          </a:stretch>
-        </p:blipFill>
-        <p:spPr>
-          <a:xfrm>
-            <a:off x="1400175" y="2847542"/>
-            <a:ext cx="2212975" cy="3324658"/>
-          </a:xfrm>
-          <a:prstGeom prst="rect">
-            <a:avLst/>
-          </a:prstGeom>
-        </p:spPr>
-      </p:pic>
-      <p:pic>
-        <p:nvPicPr>
-          <p:cNvPr id="9" name="Picture 8" descr="640x426-IMG_6757.JPG"/>
-          <p:cNvPicPr>
-            <a:picLocks noChangeAspect="1"/>
-          </p:cNvPicPr>
-          <p:nvPr/>
-        </p:nvPicPr>
-        <p:blipFill>
-          <a:blip r:embed="rId6" cstate="print"/>
-          <a:stretch>
-            <a:fillRect/>
-          </a:stretch>
-        </p:blipFill>
-        <p:spPr>
-          <a:xfrm>
-            <a:off x="3870325" y="1047750"/>
-            <a:ext cx="2590979" cy="3892550"/>
-          </a:xfrm>
-          <a:prstGeom prst="rect">
-            <a:avLst/>
-          </a:prstGeom>
+          <a:noFill/>
+          <a:ln w="9525">
+            <a:noFill/>
+            <a:miter lim="800000"/>
+            <a:headEnd/>
+            <a:tailEnd/>
+          </a:ln>
+          <a:effectLst/>
         </p:spPr>
       </p:pic>
     </p:spTree>
@@ -10902,14 +10771,18 @@
   <p:clrMapOvr>
     <a:masterClrMapping/>
   </p:clrMapOvr>
-  <p:transition spd="med"/>
-  <p:timing>
-    <p:tnLst>
-      <p:par>
-        <p:cTn id="1" dur="indefinite" restart="never" nodeType="tmRoot"/>
-      </p:par>
-    </p:tnLst>
-  </p:timing>
+  <mc:AlternateContent xmlns:mc="http://schemas.openxmlformats.org/markup-compatibility/2006">
+    <mc:Choice xmlns="" xmlns:p14="http://schemas.microsoft.com/office/powerpoint/2010/main" Requires="p14">
+      <p:transition spd="med" p14:dur="700">
+        <p:fade/>
+      </p:transition>
+    </mc:Choice>
+    <mc:Fallback>
+      <p:transition spd="med">
+        <p:fade/>
+      </p:transition>
+    </mc:Fallback>
+  </mc:AlternateContent>
 </p:sld>
 </file>
 
@@ -11099,6 +10972,226 @@
 </file>
 
 <file path=ppt/slides/slide20.xml><?xml version="1.0" encoding="utf-8"?>
+<p:sld xmlns:a="http://schemas.openxmlformats.org/drawingml/2006/main" xmlns:r="http://schemas.openxmlformats.org/officeDocument/2006/relationships" xmlns:p="http://schemas.openxmlformats.org/presentationml/2006/main">
+  <p:cSld>
+    <p:spTree>
+      <p:nvGrpSpPr>
+        <p:cNvPr id="1" name=""/>
+        <p:cNvGrpSpPr/>
+        <p:nvPr/>
+      </p:nvGrpSpPr>
+      <p:grpSpPr>
+        <a:xfrm>
+          <a:off x="0" y="0"/>
+          <a:ext cx="0" cy="0"/>
+          <a:chOff x="0" y="0"/>
+          <a:chExt cx="0" cy="0"/>
+        </a:xfrm>
+      </p:grpSpPr>
+      <p:sp>
+        <p:nvSpPr>
+          <p:cNvPr id="2" name="Title 1"/>
+          <p:cNvSpPr>
+            <a:spLocks noGrp="1"/>
+          </p:cNvSpPr>
+          <p:nvPr>
+            <p:ph type="title"/>
+          </p:nvPr>
+        </p:nvSpPr>
+        <p:spPr/>
+        <p:txBody>
+          <a:bodyPr/>
+          <a:lstStyle/>
+          <a:p>
+            <a:r>
+              <a:rPr lang="en-US" dirty="0" smtClean="0"/>
+              <a:t>Insert page title </a:t>
+            </a:r>
+            <a:endParaRPr lang="en-US" dirty="0"/>
+          </a:p>
+        </p:txBody>
+      </p:sp>
+      <p:sp>
+        <p:nvSpPr>
+          <p:cNvPr id="3" name="Text Placeholder 2"/>
+          <p:cNvSpPr>
+            <a:spLocks noGrp="1"/>
+          </p:cNvSpPr>
+          <p:nvPr>
+            <p:ph type="body" sz="quarter" idx="10"/>
+          </p:nvPr>
+        </p:nvSpPr>
+        <p:spPr/>
+        <p:txBody>
+          <a:bodyPr/>
+          <a:lstStyle/>
+          <a:p>
+            <a:pPr lvl="0"/>
+            <a:r>
+              <a:rPr lang="en-US" dirty="0" smtClean="0"/>
+              <a:t>First level</a:t>
+            </a:r>
+          </a:p>
+          <a:p>
+            <a:pPr lvl="1"/>
+            <a:r>
+              <a:rPr lang="en-US" dirty="0" smtClean="0"/>
+              <a:t>Java and OSGi, </a:t>
+            </a:r>
+            <a:r>
+              <a:rPr lang="en-US" dirty="0" err="1" smtClean="0"/>
+              <a:t>Git</a:t>
+            </a:r>
+            <a:r>
+              <a:rPr lang="en-US" dirty="0" smtClean="0"/>
+              <a:t>, Maven, </a:t>
+            </a:r>
+            <a:r>
+              <a:rPr lang="en-US" dirty="0" err="1" smtClean="0"/>
+              <a:t>MongoDB</a:t>
+            </a:r>
+            <a:endParaRPr lang="en-US" dirty="0" smtClean="0"/>
+          </a:p>
+          <a:p>
+            <a:pPr lvl="1"/>
+            <a:r>
+              <a:rPr lang="en-US" dirty="0" smtClean="0"/>
+              <a:t>Recording and Analyzing Real-World Data in Memory with Java</a:t>
+            </a:r>
+          </a:p>
+          <a:p>
+            <a:pPr lvl="0"/>
+            <a:endParaRPr lang="en-US" dirty="0" smtClean="0"/>
+          </a:p>
+          <a:p>
+            <a:pPr lvl="1"/>
+            <a:r>
+              <a:rPr lang="en-US" dirty="0" smtClean="0"/>
+              <a:t>Second level</a:t>
+            </a:r>
+          </a:p>
+          <a:p>
+            <a:pPr lvl="2"/>
+            <a:r>
+              <a:rPr lang="en-US" dirty="0" smtClean="0"/>
+              <a:t>Third level</a:t>
+            </a:r>
+          </a:p>
+        </p:txBody>
+      </p:sp>
+      <p:pic>
+        <p:nvPicPr>
+          <p:cNvPr id="4" name="Picture 3" descr="640x426-IMG_6645.JPG"/>
+          <p:cNvPicPr>
+            <a:picLocks noChangeAspect="1"/>
+          </p:cNvPicPr>
+          <p:nvPr/>
+        </p:nvPicPr>
+        <p:blipFill>
+          <a:blip r:embed="rId3" cstate="print"/>
+          <a:stretch>
+            <a:fillRect/>
+          </a:stretch>
+        </p:blipFill>
+        <p:spPr>
+          <a:xfrm>
+            <a:off x="6867525" y="1365250"/>
+            <a:ext cx="1842849" cy="2768600"/>
+          </a:xfrm>
+          <a:prstGeom prst="rect">
+            <a:avLst/>
+          </a:prstGeom>
+        </p:spPr>
+      </p:pic>
+      <p:pic>
+        <p:nvPicPr>
+          <p:cNvPr id="7" name="Picture 6" descr="640x426-IMG_6636.JPG"/>
+          <p:cNvPicPr>
+            <a:picLocks noChangeAspect="1"/>
+          </p:cNvPicPr>
+          <p:nvPr/>
+        </p:nvPicPr>
+        <p:blipFill>
+          <a:blip r:embed="rId4" cstate="print"/>
+          <a:stretch>
+            <a:fillRect/>
+          </a:stretch>
+        </p:blipFill>
+        <p:spPr>
+          <a:xfrm>
+            <a:off x="6235700" y="4718050"/>
+            <a:ext cx="1683792" cy="1120774"/>
+          </a:xfrm>
+          <a:prstGeom prst="rect">
+            <a:avLst/>
+          </a:prstGeom>
+        </p:spPr>
+      </p:pic>
+      <p:pic>
+        <p:nvPicPr>
+          <p:cNvPr id="8" name="Picture 7" descr="640x426-IMG_6760.JPG"/>
+          <p:cNvPicPr>
+            <a:picLocks noChangeAspect="1"/>
+          </p:cNvPicPr>
+          <p:nvPr/>
+        </p:nvPicPr>
+        <p:blipFill>
+          <a:blip r:embed="rId5" cstate="print"/>
+          <a:stretch>
+            <a:fillRect/>
+          </a:stretch>
+        </p:blipFill>
+        <p:spPr>
+          <a:xfrm>
+            <a:off x="1400175" y="2847542"/>
+            <a:ext cx="2212975" cy="3324658"/>
+          </a:xfrm>
+          <a:prstGeom prst="rect">
+            <a:avLst/>
+          </a:prstGeom>
+        </p:spPr>
+      </p:pic>
+      <p:pic>
+        <p:nvPicPr>
+          <p:cNvPr id="9" name="Picture 8" descr="640x426-IMG_6757.JPG"/>
+          <p:cNvPicPr>
+            <a:picLocks noChangeAspect="1"/>
+          </p:cNvPicPr>
+          <p:nvPr/>
+        </p:nvPicPr>
+        <p:blipFill>
+          <a:blip r:embed="rId6" cstate="print"/>
+          <a:stretch>
+            <a:fillRect/>
+          </a:stretch>
+        </p:blipFill>
+        <p:spPr>
+          <a:xfrm>
+            <a:off x="3870325" y="1047750"/>
+            <a:ext cx="2590979" cy="3892550"/>
+          </a:xfrm>
+          <a:prstGeom prst="rect">
+            <a:avLst/>
+          </a:prstGeom>
+        </p:spPr>
+      </p:pic>
+    </p:spTree>
+  </p:cSld>
+  <p:clrMapOvr>
+    <a:masterClrMapping/>
+  </p:clrMapOvr>
+  <p:transition spd="med"/>
+  <p:timing>
+    <p:tnLst>
+      <p:par>
+        <p:cTn id="1" dur="indefinite" restart="never" nodeType="tmRoot"/>
+      </p:par>
+    </p:tnLst>
+  </p:timing>
+</p:sld>
+</file>
+
+<file path=ppt/slides/slide21.xml><?xml version="1.0" encoding="utf-8"?>
 <p:sld xmlns:a="http://schemas.openxmlformats.org/drawingml/2006/main" xmlns:r="http://schemas.openxmlformats.org/officeDocument/2006/relationships" xmlns:p="http://schemas.openxmlformats.org/presentationml/2006/main">
   <p:cSld>
     <p:spTree>
@@ -11394,99 +11487,6 @@
       </p:par>
     </p:tnLst>
   </p:timing>
-</p:sld>
-</file>
-
-<file path=ppt/slides/slide21.xml><?xml version="1.0" encoding="utf-8"?>
-<p:sld xmlns:a="http://schemas.openxmlformats.org/drawingml/2006/main" xmlns:r="http://schemas.openxmlformats.org/officeDocument/2006/relationships" xmlns:p="http://schemas.openxmlformats.org/presentationml/2006/main">
-  <p:cSld>
-    <p:spTree>
-      <p:nvGrpSpPr>
-        <p:cNvPr id="1" name=""/>
-        <p:cNvGrpSpPr/>
-        <p:nvPr/>
-      </p:nvGrpSpPr>
-      <p:grpSpPr>
-        <a:xfrm>
-          <a:off x="0" y="0"/>
-          <a:ext cx="0" cy="0"/>
-          <a:chOff x="0" y="0"/>
-          <a:chExt cx="0" cy="0"/>
-        </a:xfrm>
-      </p:grpSpPr>
-      <p:sp>
-        <p:nvSpPr>
-          <p:cNvPr id="2" name="Title 1"/>
-          <p:cNvSpPr>
-            <a:spLocks noGrp="1"/>
-          </p:cNvSpPr>
-          <p:nvPr>
-            <p:ph type="title"/>
-          </p:nvPr>
-        </p:nvSpPr>
-        <p:spPr/>
-        <p:txBody>
-          <a:bodyPr/>
-          <a:lstStyle/>
-          <a:p>
-            <a:r>
-              <a:rPr lang="en-US" dirty="0" smtClean="0"/>
-              <a:t>Leaderboard as Re-Built with GWT</a:t>
-            </a:r>
-            <a:endParaRPr lang="en-US" dirty="0"/>
-          </a:p>
-        </p:txBody>
-      </p:sp>
-      <p:pic>
-        <p:nvPicPr>
-          <p:cNvPr id="2051" name="Picture 3"/>
-          <p:cNvPicPr>
-            <a:picLocks noChangeAspect="1" noChangeArrowheads="1"/>
-          </p:cNvPicPr>
-          <p:nvPr/>
-        </p:nvPicPr>
-        <p:blipFill>
-          <a:blip r:embed="rId2" cstate="print"/>
-          <a:srcRect/>
-          <a:stretch>
-            <a:fillRect/>
-          </a:stretch>
-        </p:blipFill>
-        <p:spPr bwMode="auto">
-          <a:xfrm>
-            <a:off x="613158" y="1315567"/>
-            <a:ext cx="7958085" cy="4864552"/>
-          </a:xfrm>
-          <a:prstGeom prst="rect">
-            <a:avLst/>
-          </a:prstGeom>
-          <a:noFill/>
-          <a:ln w="9525">
-            <a:noFill/>
-            <a:miter lim="800000"/>
-            <a:headEnd/>
-            <a:tailEnd/>
-          </a:ln>
-          <a:effectLst/>
-        </p:spPr>
-      </p:pic>
-    </p:spTree>
-  </p:cSld>
-  <p:clrMapOvr>
-    <a:masterClrMapping/>
-  </p:clrMapOvr>
-  <mc:AlternateContent xmlns:mc="http://schemas.openxmlformats.org/markup-compatibility/2006">
-    <mc:Choice xmlns="" xmlns:p14="http://schemas.microsoft.com/office/powerpoint/2010/main" Requires="p14">
-      <p:transition spd="med" p14:dur="700">
-        <p:fade/>
-      </p:transition>
-    </mc:Choice>
-    <mc:Fallback>
-      <p:transition spd="med">
-        <p:fade/>
-      </p:transition>
-    </mc:Fallback>
-  </mc:AlternateContent>
 </p:sld>
 </file>
 

</xml_diff>

<commit_message>
fixed use of LowPointWinnerGetsZero scoring scheme
</commit_message>
<xml_diff>
--- a/doc/SAPSailingAnalyticsArchitecture.pptx
+++ b/doc/SAPSailingAnalyticsArchitecture.pptx
@@ -30,12 +30,12 @@
     <p:sldId id="348" r:id="rId18"/>
     <p:sldId id="349" r:id="rId19"/>
     <p:sldId id="368" r:id="rId20"/>
-    <p:sldId id="356" r:id="rId21"/>
-    <p:sldId id="357" r:id="rId22"/>
-    <p:sldId id="350" r:id="rId23"/>
-    <p:sldId id="351" r:id="rId24"/>
-    <p:sldId id="352" r:id="rId25"/>
-    <p:sldId id="353" r:id="rId26"/>
+    <p:sldId id="370" r:id="rId21"/>
+    <p:sldId id="369" r:id="rId22"/>
+    <p:sldId id="352" r:id="rId23"/>
+    <p:sldId id="353" r:id="rId24"/>
+    <p:sldId id="356" r:id="rId25"/>
+    <p:sldId id="357" r:id="rId26"/>
     <p:sldId id="354" r:id="rId27"/>
     <p:sldId id="325" r:id="rId28"/>
     <p:sldId id="355" r:id="rId29"/>
@@ -625,7 +625,7 @@
           </a:bodyPr>
           <a:lstStyle/>
           <a:p>
-            <a:endParaRPr lang="en-US" dirty="0"/>
+            <a:endParaRPr lang="en-US"/>
           </a:p>
         </p:txBody>
       </p:sp>
@@ -647,7 +647,7 @@
             <a:fld id="{7D8C2C35-2B8A-446E-BEC0-FD36716C29AC}" type="slidenum">
               <a:rPr lang="de-DE" smtClean="0"/>
               <a:pPr/>
-              <a:t>20</a:t>
+              <a:t>22</a:t>
             </a:fld>
             <a:endParaRPr lang="de-DE" dirty="0"/>
           </a:p>
@@ -729,7 +729,7 @@
             <a:fld id="{7D8C2C35-2B8A-446E-BEC0-FD36716C29AC}" type="slidenum">
               <a:rPr lang="de-DE" smtClean="0"/>
               <a:pPr/>
-              <a:t>21</a:t>
+              <a:t>23</a:t>
             </a:fld>
             <a:endParaRPr lang="de-DE" dirty="0"/>
           </a:p>
@@ -789,7 +789,7 @@
           </a:bodyPr>
           <a:lstStyle/>
           <a:p>
-            <a:endParaRPr lang="en-US"/>
+            <a:endParaRPr lang="en-US" dirty="0"/>
           </a:p>
         </p:txBody>
       </p:sp>
@@ -811,7 +811,7 @@
             <a:fld id="{7D8C2C35-2B8A-446E-BEC0-FD36716C29AC}" type="slidenum">
               <a:rPr lang="de-DE" smtClean="0"/>
               <a:pPr/>
-              <a:t>22</a:t>
+              <a:t>24</a:t>
             </a:fld>
             <a:endParaRPr lang="de-DE" dirty="0"/>
           </a:p>
@@ -893,7 +893,7 @@
             <a:fld id="{7D8C2C35-2B8A-446E-BEC0-FD36716C29AC}" type="slidenum">
               <a:rPr lang="de-DE" smtClean="0"/>
               <a:pPr/>
-              <a:t>23</a:t>
+              <a:t>25</a:t>
             </a:fld>
             <a:endParaRPr lang="de-DE" dirty="0"/>
           </a:p>
@@ -975,7 +975,7 @@
             <a:fld id="{7D8C2C35-2B8A-446E-BEC0-FD36716C29AC}" type="slidenum">
               <a:rPr lang="de-DE" smtClean="0"/>
               <a:pPr/>
-              <a:t>24</a:t>
+              <a:t>26</a:t>
             </a:fld>
             <a:endParaRPr lang="de-DE" dirty="0"/>
           </a:p>
@@ -1057,7 +1057,7 @@
             <a:fld id="{7D8C2C35-2B8A-446E-BEC0-FD36716C29AC}" type="slidenum">
               <a:rPr lang="de-DE" smtClean="0"/>
               <a:pPr/>
-              <a:t>25</a:t>
+              <a:t>27</a:t>
             </a:fld>
             <a:endParaRPr lang="de-DE" dirty="0"/>
           </a:p>
@@ -1139,7 +1139,7 @@
             <a:fld id="{7D8C2C35-2B8A-446E-BEC0-FD36716C29AC}" type="slidenum">
               <a:rPr lang="de-DE" smtClean="0"/>
               <a:pPr/>
-              <a:t>26</a:t>
+              <a:t>28</a:t>
             </a:fld>
             <a:endParaRPr lang="de-DE" dirty="0"/>
           </a:p>
@@ -1199,7 +1199,7 @@
           </a:bodyPr>
           <a:lstStyle/>
           <a:p>
-            <a:endParaRPr lang="en-US" dirty="0"/>
+            <a:endParaRPr lang="en-US"/>
           </a:p>
         </p:txBody>
       </p:sp>
@@ -1221,7 +1221,7 @@
             <a:fld id="{7D8C2C35-2B8A-446E-BEC0-FD36716C29AC}" type="slidenum">
               <a:rPr lang="de-DE" smtClean="0"/>
               <a:pPr/>
-              <a:t>27</a:t>
+              <a:t>29</a:t>
             </a:fld>
             <a:endParaRPr lang="de-DE" dirty="0"/>
           </a:p>
@@ -1281,7 +1281,7 @@
           </a:bodyPr>
           <a:lstStyle/>
           <a:p>
-            <a:endParaRPr lang="en-US"/>
+            <a:endParaRPr lang="en-US" dirty="0"/>
           </a:p>
         </p:txBody>
       </p:sp>
@@ -1303,7 +1303,7 @@
             <a:fld id="{7D8C2C35-2B8A-446E-BEC0-FD36716C29AC}" type="slidenum">
               <a:rPr lang="de-DE" smtClean="0"/>
               <a:pPr/>
-              <a:t>28</a:t>
+              <a:t>30</a:t>
             </a:fld>
             <a:endParaRPr lang="de-DE" dirty="0"/>
           </a:p>
@@ -1385,7 +1385,7 @@
             <a:fld id="{7D8C2C35-2B8A-446E-BEC0-FD36716C29AC}" type="slidenum">
               <a:rPr lang="de-DE" smtClean="0"/>
               <a:pPr/>
-              <a:t>29</a:t>
+              <a:t>31</a:t>
             </a:fld>
             <a:endParaRPr lang="de-DE" dirty="0"/>
           </a:p>
@@ -1500,7 +1500,31 @@
       </p:grpSpPr>
       <p:sp>
         <p:nvSpPr>
-          <p:cNvPr id="2" name="Slide Image Placeholder 1"/>
+          <p:cNvPr id="4" name="Slide Number Placeholder 3"/>
+          <p:cNvSpPr>
+            <a:spLocks noGrp="1"/>
+          </p:cNvSpPr>
+          <p:nvPr>
+            <p:ph type="sldNum" sz="quarter" idx="10"/>
+          </p:nvPr>
+        </p:nvSpPr>
+        <p:spPr/>
+        <p:txBody>
+          <a:bodyPr/>
+          <a:lstStyle/>
+          <a:p>
+            <a:fld id="{7D8C2C35-2B8A-446E-BEC0-FD36716C29AC}" type="slidenum">
+              <a:rPr lang="de-DE" smtClean="0"/>
+              <a:pPr/>
+              <a:t>32</a:t>
+            </a:fld>
+            <a:endParaRPr lang="de-DE" dirty="0"/>
+          </a:p>
+        </p:txBody>
+      </p:sp>
+      <p:sp>
+        <p:nvSpPr>
+          <p:cNvPr id="15" name="Slide Image Placeholder 14"/>
           <p:cNvSpPr>
             <a:spLocks noGrp="1" noRot="1" noChangeAspect="1"/>
           </p:cNvSpPr>
@@ -1512,7 +1536,7 @@
       </p:sp>
       <p:sp>
         <p:nvSpPr>
-          <p:cNvPr id="3" name="Notes Placeholder 2"/>
+          <p:cNvPr id="16" name="Notes Placeholder 15"/>
           <p:cNvSpPr>
             <a:spLocks noGrp="1"/>
           </p:cNvSpPr>
@@ -1527,30 +1551,6 @@
           </a:bodyPr>
           <a:lstStyle/>
           <a:p>
-            <a:endParaRPr lang="en-US" dirty="0"/>
-          </a:p>
-        </p:txBody>
-      </p:sp>
-      <p:sp>
-        <p:nvSpPr>
-          <p:cNvPr id="4" name="Slide Number Placeholder 3"/>
-          <p:cNvSpPr>
-            <a:spLocks noGrp="1"/>
-          </p:cNvSpPr>
-          <p:nvPr>
-            <p:ph type="sldNum" sz="quarter" idx="10"/>
-          </p:nvPr>
-        </p:nvSpPr>
-        <p:spPr/>
-        <p:txBody>
-          <a:bodyPr/>
-          <a:lstStyle/>
-          <a:p>
-            <a:fld id="{7D8C2C35-2B8A-446E-BEC0-FD36716C29AC}" type="slidenum">
-              <a:rPr lang="de-DE" smtClean="0"/>
-              <a:pPr/>
-              <a:t>30</a:t>
-            </a:fld>
             <a:endParaRPr lang="de-DE" dirty="0"/>
           </a:p>
         </p:txBody>
@@ -1564,170 +1564,6 @@
 </file>
 
 <file path=ppt/notesSlides/notesSlide21.xml><?xml version="1.0" encoding="utf-8"?>
-<p:notes xmlns:a="http://schemas.openxmlformats.org/drawingml/2006/main" xmlns:r="http://schemas.openxmlformats.org/officeDocument/2006/relationships" xmlns:p="http://schemas.openxmlformats.org/presentationml/2006/main">
-  <p:cSld>
-    <p:spTree>
-      <p:nvGrpSpPr>
-        <p:cNvPr id="1" name=""/>
-        <p:cNvGrpSpPr/>
-        <p:nvPr/>
-      </p:nvGrpSpPr>
-      <p:grpSpPr>
-        <a:xfrm>
-          <a:off x="0" y="0"/>
-          <a:ext cx="0" cy="0"/>
-          <a:chOff x="0" y="0"/>
-          <a:chExt cx="0" cy="0"/>
-        </a:xfrm>
-      </p:grpSpPr>
-      <p:sp>
-        <p:nvSpPr>
-          <p:cNvPr id="2" name="Slide Image Placeholder 1"/>
-          <p:cNvSpPr>
-            <a:spLocks noGrp="1" noRot="1" noChangeAspect="1"/>
-          </p:cNvSpPr>
-          <p:nvPr>
-            <p:ph type="sldImg"/>
-          </p:nvPr>
-        </p:nvSpPr>
-        <p:spPr/>
-      </p:sp>
-      <p:sp>
-        <p:nvSpPr>
-          <p:cNvPr id="3" name="Notes Placeholder 2"/>
-          <p:cNvSpPr>
-            <a:spLocks noGrp="1"/>
-          </p:cNvSpPr>
-          <p:nvPr>
-            <p:ph type="body" idx="1"/>
-          </p:nvPr>
-        </p:nvSpPr>
-        <p:spPr/>
-        <p:txBody>
-          <a:bodyPr>
-            <a:normAutofit/>
-          </a:bodyPr>
-          <a:lstStyle/>
-          <a:p>
-            <a:endParaRPr lang="en-US"/>
-          </a:p>
-        </p:txBody>
-      </p:sp>
-      <p:sp>
-        <p:nvSpPr>
-          <p:cNvPr id="4" name="Slide Number Placeholder 3"/>
-          <p:cNvSpPr>
-            <a:spLocks noGrp="1"/>
-          </p:cNvSpPr>
-          <p:nvPr>
-            <p:ph type="sldNum" sz="quarter" idx="10"/>
-          </p:nvPr>
-        </p:nvSpPr>
-        <p:spPr/>
-        <p:txBody>
-          <a:bodyPr/>
-          <a:lstStyle/>
-          <a:p>
-            <a:fld id="{7D8C2C35-2B8A-446E-BEC0-FD36716C29AC}" type="slidenum">
-              <a:rPr lang="de-DE" smtClean="0"/>
-              <a:pPr/>
-              <a:t>31</a:t>
-            </a:fld>
-            <a:endParaRPr lang="de-DE" dirty="0"/>
-          </a:p>
-        </p:txBody>
-      </p:sp>
-    </p:spTree>
-  </p:cSld>
-  <p:clrMapOvr>
-    <a:masterClrMapping/>
-  </p:clrMapOvr>
-</p:notes>
-</file>
-
-<file path=ppt/notesSlides/notesSlide22.xml><?xml version="1.0" encoding="utf-8"?>
-<p:notes xmlns:a="http://schemas.openxmlformats.org/drawingml/2006/main" xmlns:r="http://schemas.openxmlformats.org/officeDocument/2006/relationships" xmlns:p="http://schemas.openxmlformats.org/presentationml/2006/main">
-  <p:cSld>
-    <p:spTree>
-      <p:nvGrpSpPr>
-        <p:cNvPr id="1" name=""/>
-        <p:cNvGrpSpPr/>
-        <p:nvPr/>
-      </p:nvGrpSpPr>
-      <p:grpSpPr>
-        <a:xfrm>
-          <a:off x="0" y="0"/>
-          <a:ext cx="0" cy="0"/>
-          <a:chOff x="0" y="0"/>
-          <a:chExt cx="0" cy="0"/>
-        </a:xfrm>
-      </p:grpSpPr>
-      <p:sp>
-        <p:nvSpPr>
-          <p:cNvPr id="4" name="Slide Number Placeholder 3"/>
-          <p:cNvSpPr>
-            <a:spLocks noGrp="1"/>
-          </p:cNvSpPr>
-          <p:nvPr>
-            <p:ph type="sldNum" sz="quarter" idx="10"/>
-          </p:nvPr>
-        </p:nvSpPr>
-        <p:spPr/>
-        <p:txBody>
-          <a:bodyPr/>
-          <a:lstStyle/>
-          <a:p>
-            <a:fld id="{7D8C2C35-2B8A-446E-BEC0-FD36716C29AC}" type="slidenum">
-              <a:rPr lang="de-DE" smtClean="0"/>
-              <a:pPr/>
-              <a:t>32</a:t>
-            </a:fld>
-            <a:endParaRPr lang="de-DE" dirty="0"/>
-          </a:p>
-        </p:txBody>
-      </p:sp>
-      <p:sp>
-        <p:nvSpPr>
-          <p:cNvPr id="15" name="Slide Image Placeholder 14"/>
-          <p:cNvSpPr>
-            <a:spLocks noGrp="1" noRot="1" noChangeAspect="1"/>
-          </p:cNvSpPr>
-          <p:nvPr>
-            <p:ph type="sldImg"/>
-          </p:nvPr>
-        </p:nvSpPr>
-        <p:spPr/>
-      </p:sp>
-      <p:sp>
-        <p:nvSpPr>
-          <p:cNvPr id="16" name="Notes Placeholder 15"/>
-          <p:cNvSpPr>
-            <a:spLocks noGrp="1"/>
-          </p:cNvSpPr>
-          <p:nvPr>
-            <p:ph type="body" idx="1"/>
-          </p:nvPr>
-        </p:nvSpPr>
-        <p:spPr/>
-        <p:txBody>
-          <a:bodyPr>
-            <a:normAutofit/>
-          </a:bodyPr>
-          <a:lstStyle/>
-          <a:p>
-            <a:endParaRPr lang="de-DE" dirty="0"/>
-          </a:p>
-        </p:txBody>
-      </p:sp>
-    </p:spTree>
-  </p:cSld>
-  <p:clrMapOvr>
-    <a:masterClrMapping/>
-  </p:clrMapOvr>
-</p:notes>
-</file>
-
-<file path=ppt/notesSlides/notesSlide23.xml><?xml version="1.0" encoding="utf-8"?>
 <p:notes xmlns:a="http://schemas.openxmlformats.org/drawingml/2006/main" xmlns:r="http://schemas.openxmlformats.org/officeDocument/2006/relationships" xmlns:p="http://schemas.openxmlformats.org/presentationml/2006/main">
   <p:cSld>
     <p:spTree>
@@ -10928,13 +10764,10 @@
             </a:r>
           </a:p>
           <a:p>
-            <a:r>
-              <a:rPr lang="en-US" dirty="0" smtClean="0"/>
-              <a:t>Towards Web Bundles and </a:t>
-            </a:r>
-            <a:r>
-              <a:rPr lang="en-US" dirty="0" err="1" smtClean="0"/>
-              <a:t>Restlets</a:t>
+            <a:pPr lvl="1"/>
+            <a:r>
+              <a:rPr lang="en-US" dirty="0" smtClean="0"/>
+              <a:t>Using OSGi Web Bundles</a:t>
             </a:r>
             <a:endParaRPr lang="en-US" dirty="0" smtClean="0"/>
           </a:p>
@@ -11005,6 +10838,628 @@
           <a:p>
             <a:r>
               <a:rPr lang="en-US" dirty="0" smtClean="0"/>
+              <a:t>Switched from Explicit Registration to OSGi Web Bundles</a:t>
+            </a:r>
+            <a:endParaRPr lang="en-US" dirty="0"/>
+          </a:p>
+        </p:txBody>
+      </p:sp>
+      <p:sp>
+        <p:nvSpPr>
+          <p:cNvPr id="3" name="Text Placeholder 2"/>
+          <p:cNvSpPr>
+            <a:spLocks noGrp="1"/>
+          </p:cNvSpPr>
+          <p:nvPr>
+            <p:ph type="body" sz="quarter" idx="10"/>
+          </p:nvPr>
+        </p:nvSpPr>
+        <p:spPr/>
+        <p:txBody>
+          <a:bodyPr/>
+          <a:lstStyle/>
+          <a:p>
+            <a:r>
+              <a:rPr lang="en-US" dirty="0" smtClean="0"/>
+              <a:t>Turned all Servlet/</a:t>
+            </a:r>
+            <a:r>
+              <a:rPr lang="en-US" dirty="0" err="1" smtClean="0"/>
+              <a:t>RESTlet</a:t>
+            </a:r>
+            <a:r>
+              <a:rPr lang="en-US" dirty="0" smtClean="0"/>
+              <a:t> providers into OSGi Web Bundles</a:t>
+            </a:r>
+            <a:endParaRPr lang="en-US" dirty="0" smtClean="0"/>
+          </a:p>
+          <a:p>
+            <a:pPr lvl="2"/>
+            <a:r>
+              <a:rPr lang="en-US" dirty="0" smtClean="0"/>
+              <a:t>No longer requires explicit registration in activator</a:t>
+            </a:r>
+          </a:p>
+          <a:p>
+            <a:pPr lvl="2"/>
+            <a:r>
+              <a:rPr lang="en-US" dirty="0" smtClean="0">
+                <a:sym typeface="Wingdings" pitchFamily="2" charset="2"/>
+              </a:rPr>
+              <a:t>Bundle start/stop and registration / deregistration handled automatically</a:t>
+            </a:r>
+          </a:p>
+          <a:p>
+            <a:pPr lvl="2"/>
+            <a:r>
+              <a:rPr lang="en-US" dirty="0" smtClean="0">
+                <a:sym typeface="Wingdings" pitchFamily="2" charset="2"/>
+              </a:rPr>
+              <a:t>Easily supports exposing web content</a:t>
+            </a:r>
+          </a:p>
+          <a:p>
+            <a:endParaRPr lang="en-US" dirty="0" smtClean="0">
+              <a:sym typeface="Wingdings" pitchFamily="2" charset="2"/>
+            </a:endParaRPr>
+          </a:p>
+          <a:p>
+            <a:endParaRPr lang="en-US" dirty="0" smtClean="0">
+              <a:sym typeface="Wingdings" pitchFamily="2" charset="2"/>
+            </a:endParaRPr>
+          </a:p>
+          <a:p>
+            <a:endParaRPr lang="en-US" dirty="0" smtClean="0">
+              <a:sym typeface="Wingdings" pitchFamily="2" charset="2"/>
+            </a:endParaRPr>
+          </a:p>
+          <a:p>
+            <a:endParaRPr lang="en-US" dirty="0" smtClean="0">
+              <a:sym typeface="Wingdings" pitchFamily="2" charset="2"/>
+            </a:endParaRPr>
+          </a:p>
+          <a:p>
+            <a:endParaRPr lang="en-US" dirty="0" smtClean="0">
+              <a:sym typeface="Wingdings" pitchFamily="2" charset="2"/>
+            </a:endParaRPr>
+          </a:p>
+          <a:p>
+            <a:pPr>
+              <a:buFont typeface="Wingdings"/>
+              <a:buChar char="à"/>
+            </a:pPr>
+            <a:r>
+              <a:rPr lang="en-US" dirty="0" smtClean="0">
+                <a:sym typeface="Wingdings" pitchFamily="2" charset="2"/>
+              </a:rPr>
+              <a:t>Easy compatible upgrades of UI and gateway bundles in running server</a:t>
+            </a:r>
+          </a:p>
+          <a:p>
+            <a:pPr lvl="2"/>
+            <a:r>
+              <a:rPr lang="en-US" dirty="0" smtClean="0">
+                <a:sym typeface="Wingdings" pitchFamily="2" charset="2"/>
+              </a:rPr>
+              <a:t>Helpful if server state is a bit expensive to re-construct after start-up</a:t>
+            </a:r>
+            <a:endParaRPr lang="en-US" dirty="0" smtClean="0">
+              <a:sym typeface="Wingdings" pitchFamily="2" charset="2"/>
+            </a:endParaRPr>
+          </a:p>
+        </p:txBody>
+      </p:sp>
+      <p:pic>
+        <p:nvPicPr>
+          <p:cNvPr id="3074" name="Picture 2"/>
+          <p:cNvPicPr>
+            <a:picLocks noChangeAspect="1" noChangeArrowheads="1"/>
+          </p:cNvPicPr>
+          <p:nvPr/>
+        </p:nvPicPr>
+        <p:blipFill>
+          <a:blip r:embed="rId2" cstate="print"/>
+          <a:srcRect/>
+          <a:stretch>
+            <a:fillRect/>
+          </a:stretch>
+        </p:blipFill>
+        <p:spPr bwMode="auto">
+          <a:xfrm>
+            <a:off x="980036" y="3367982"/>
+            <a:ext cx="3105150" cy="1876425"/>
+          </a:xfrm>
+          <a:prstGeom prst="rect">
+            <a:avLst/>
+          </a:prstGeom>
+          <a:noFill/>
+          <a:ln w="9525">
+            <a:noFill/>
+            <a:miter lim="800000"/>
+            <a:headEnd/>
+            <a:tailEnd/>
+          </a:ln>
+          <a:effectLst/>
+        </p:spPr>
+      </p:pic>
+      <p:pic>
+        <p:nvPicPr>
+          <p:cNvPr id="3075" name="Picture 3"/>
+          <p:cNvPicPr>
+            <a:picLocks noChangeAspect="1" noChangeArrowheads="1"/>
+          </p:cNvPicPr>
+          <p:nvPr/>
+        </p:nvPicPr>
+        <p:blipFill>
+          <a:blip r:embed="rId3" cstate="print"/>
+          <a:srcRect/>
+          <a:stretch>
+            <a:fillRect/>
+          </a:stretch>
+        </p:blipFill>
+        <p:spPr bwMode="auto">
+          <a:xfrm>
+            <a:off x="4993179" y="3933680"/>
+            <a:ext cx="3048000" cy="323850"/>
+          </a:xfrm>
+          <a:prstGeom prst="rect">
+            <a:avLst/>
+          </a:prstGeom>
+          <a:noFill/>
+          <a:ln w="9525">
+            <a:noFill/>
+            <a:miter lim="800000"/>
+            <a:headEnd/>
+            <a:tailEnd/>
+          </a:ln>
+          <a:effectLst/>
+        </p:spPr>
+      </p:pic>
+      <p:sp>
+        <p:nvSpPr>
+          <p:cNvPr id="6" name="TextBox 5"/>
+          <p:cNvSpPr txBox="1"/>
+          <p:nvPr/>
+        </p:nvSpPr>
+        <p:spPr>
+          <a:xfrm>
+            <a:off x="4976552" y="3474720"/>
+            <a:ext cx="1821011" cy="276999"/>
+          </a:xfrm>
+          <a:prstGeom prst="rect">
+            <a:avLst/>
+          </a:prstGeom>
+          <a:noFill/>
+        </p:spPr>
+        <p:txBody>
+          <a:bodyPr wrap="none" lIns="0" tIns="0" rIns="0" bIns="0" rtlCol="0">
+            <a:spAutoFit/>
+          </a:bodyPr>
+          <a:lstStyle/>
+          <a:p>
+            <a:pPr fontAlgn="base">
+              <a:spcBef>
+                <a:spcPct val="50000"/>
+              </a:spcBef>
+              <a:spcAft>
+                <a:spcPct val="0"/>
+              </a:spcAft>
+              <a:buClr>
+                <a:srgbClr val="F0AB00"/>
+              </a:buClr>
+              <a:buSzPct val="80000"/>
+            </a:pPr>
+            <a:r>
+              <a:rPr lang="en-US" sz="1800" kern="0" dirty="0" smtClean="0">
+                <a:ea typeface="Arial Unicode MS" pitchFamily="34" charset="-128"/>
+                <a:cs typeface="Arial Unicode MS" pitchFamily="34" charset="-128"/>
+              </a:rPr>
+              <a:t>In MANIFEST.MF</a:t>
+            </a:r>
+            <a:endParaRPr lang="en-US" sz="1800" kern="0" dirty="0" smtClean="0">
+              <a:ea typeface="Arial Unicode MS" pitchFamily="34" charset="-128"/>
+              <a:cs typeface="Arial Unicode MS" pitchFamily="34" charset="-128"/>
+            </a:endParaRPr>
+          </a:p>
+        </p:txBody>
+      </p:sp>
+    </p:spTree>
+  </p:cSld>
+  <p:clrMapOvr>
+    <a:masterClrMapping/>
+  </p:clrMapOvr>
+</p:sld>
+</file>
+
+<file path=ppt/slides/slide21.xml><?xml version="1.0" encoding="utf-8"?>
+<p:sld xmlns:a="http://schemas.openxmlformats.org/drawingml/2006/main" xmlns:r="http://schemas.openxmlformats.org/officeDocument/2006/relationships" xmlns:p="http://schemas.openxmlformats.org/presentationml/2006/main">
+  <p:cSld>
+    <p:spTree>
+      <p:nvGrpSpPr>
+        <p:cNvPr id="1" name=""/>
+        <p:cNvGrpSpPr/>
+        <p:nvPr/>
+      </p:nvGrpSpPr>
+      <p:grpSpPr>
+        <a:xfrm>
+          <a:off x="0" y="0"/>
+          <a:ext cx="0" cy="0"/>
+          <a:chOff x="0" y="0"/>
+          <a:chExt cx="0" cy="0"/>
+        </a:xfrm>
+      </p:grpSpPr>
+      <p:sp>
+        <p:nvSpPr>
+          <p:cNvPr id="2" name="Title 1"/>
+          <p:cNvSpPr>
+            <a:spLocks noGrp="1"/>
+          </p:cNvSpPr>
+          <p:nvPr>
+            <p:ph type="title"/>
+          </p:nvPr>
+        </p:nvSpPr>
+        <p:spPr/>
+        <p:txBody>
+          <a:bodyPr/>
+          <a:lstStyle/>
+          <a:p>
+            <a:r>
+              <a:rPr lang="en-US" dirty="0" smtClean="0"/>
+              <a:t>GWT Bundles in OSGi</a:t>
+            </a:r>
+            <a:endParaRPr lang="en-US" dirty="0"/>
+          </a:p>
+        </p:txBody>
+      </p:sp>
+      <p:pic>
+        <p:nvPicPr>
+          <p:cNvPr id="2051" name="Picture 3"/>
+          <p:cNvPicPr>
+            <a:picLocks noChangeAspect="1" noChangeArrowheads="1"/>
+          </p:cNvPicPr>
+          <p:nvPr/>
+        </p:nvPicPr>
+        <p:blipFill>
+          <a:blip r:embed="rId2" cstate="print"/>
+          <a:srcRect/>
+          <a:stretch>
+            <a:fillRect/>
+          </a:stretch>
+        </p:blipFill>
+        <p:spPr bwMode="auto">
+          <a:xfrm>
+            <a:off x="687185" y="1006027"/>
+            <a:ext cx="7669877" cy="5748927"/>
+          </a:xfrm>
+          <a:prstGeom prst="rect">
+            <a:avLst/>
+          </a:prstGeom>
+          <a:noFill/>
+          <a:ln w="9525">
+            <a:noFill/>
+            <a:miter lim="800000"/>
+            <a:headEnd/>
+            <a:tailEnd/>
+          </a:ln>
+          <a:effectLst/>
+        </p:spPr>
+      </p:pic>
+    </p:spTree>
+  </p:cSld>
+  <p:clrMapOvr>
+    <a:masterClrMapping/>
+  </p:clrMapOvr>
+</p:sld>
+</file>
+
+<file path=ppt/slides/slide22.xml><?xml version="1.0" encoding="utf-8"?>
+<p:sld xmlns:a="http://schemas.openxmlformats.org/drawingml/2006/main" xmlns:r="http://schemas.openxmlformats.org/officeDocument/2006/relationships" xmlns:p="http://schemas.openxmlformats.org/presentationml/2006/main">
+  <p:cSld>
+    <p:spTree>
+      <p:nvGrpSpPr>
+        <p:cNvPr id="1" name=""/>
+        <p:cNvGrpSpPr/>
+        <p:nvPr/>
+      </p:nvGrpSpPr>
+      <p:grpSpPr>
+        <a:xfrm>
+          <a:off x="0" y="0"/>
+          <a:ext cx="0" cy="0"/>
+          <a:chOff x="0" y="0"/>
+          <a:chExt cx="0" cy="0"/>
+        </a:xfrm>
+      </p:grpSpPr>
+      <p:sp>
+        <p:nvSpPr>
+          <p:cNvPr id="3" name="Title 2"/>
+          <p:cNvSpPr>
+            <a:spLocks noGrp="1"/>
+          </p:cNvSpPr>
+          <p:nvPr>
+            <p:ph type="ctrTitle"/>
+          </p:nvPr>
+        </p:nvSpPr>
+        <p:spPr/>
+        <p:txBody>
+          <a:bodyPr/>
+          <a:lstStyle/>
+          <a:p>
+            <a:r>
+              <a:rPr lang="en-US" sz="3200" dirty="0" smtClean="0"/>
+              <a:t>Caching and Locking in a Highly Concurrent Environment</a:t>
+            </a:r>
+          </a:p>
+        </p:txBody>
+      </p:sp>
+      <p:pic>
+        <p:nvPicPr>
+          <p:cNvPr id="7" name="Picture 2" descr="C:\Users\d019534\AppData\Local\Microsoft\Windows\Temporary Internet Files\Content.IE5\M8B9MV8Z\273539_l_srgb_s_gl[1].jpg"/>
+          <p:cNvPicPr>
+            <a:picLocks noGrp="1" noChangeAspect="1" noChangeArrowheads="1"/>
+          </p:cNvPicPr>
+          <p:nvPr>
+            <p:ph type="pic" sz="quarter" idx="11"/>
+          </p:nvPr>
+        </p:nvPicPr>
+        <p:blipFill rotWithShape="1">
+          <a:blip r:embed="rId3" cstate="screen">
+            <a:extLst>
+              <a:ext uri="{28A0092B-C50C-407E-A947-70E740481C1C}">
+                <a14:useLocalDpi xmlns:a14="http://schemas.microsoft.com/office/drawing/2010/main" xmlns=""/>
+              </a:ext>
+            </a:extLst>
+          </a:blip>
+          <a:srcRect l="10" r="10"/>
+          <a:stretch/>
+        </p:blipFill>
+        <p:spPr bwMode="auto">
+          <a:prstGeom prst="rect">
+            <a:avLst/>
+          </a:prstGeom>
+          <a:noFill/>
+          <a:ln>
+            <a:noFill/>
+          </a:ln>
+          <a:extLst>
+            <a:ext uri="{909E8E84-426E-40DD-AFC4-6F175D3DCCD1}">
+              <a14:hiddenFill xmlns:a14="http://schemas.microsoft.com/office/drawing/2010/main" xmlns="">
+                <a:solidFill>
+                  <a:srgbClr val="FFFFFF"/>
+                </a:solidFill>
+              </a14:hiddenFill>
+            </a:ext>
+          </a:extLst>
+        </p:spPr>
+      </p:pic>
+    </p:spTree>
+  </p:cSld>
+  <p:clrMapOvr>
+    <a:masterClrMapping/>
+  </p:clrMapOvr>
+</p:sld>
+</file>
+
+<file path=ppt/slides/slide23.xml><?xml version="1.0" encoding="utf-8"?>
+<p:sld xmlns:a="http://schemas.openxmlformats.org/drawingml/2006/main" xmlns:r="http://schemas.openxmlformats.org/officeDocument/2006/relationships" xmlns:p="http://schemas.openxmlformats.org/presentationml/2006/main">
+  <p:cSld>
+    <p:spTree>
+      <p:nvGrpSpPr>
+        <p:cNvPr id="1" name=""/>
+        <p:cNvGrpSpPr/>
+        <p:nvPr/>
+      </p:nvGrpSpPr>
+      <p:grpSpPr>
+        <a:xfrm>
+          <a:off x="0" y="0"/>
+          <a:ext cx="0" cy="0"/>
+          <a:chOff x="0" y="0"/>
+          <a:chExt cx="0" cy="0"/>
+        </a:xfrm>
+      </p:grpSpPr>
+      <p:sp>
+        <p:nvSpPr>
+          <p:cNvPr id="2" name="Title 1"/>
+          <p:cNvSpPr>
+            <a:spLocks noGrp="1"/>
+          </p:cNvSpPr>
+          <p:nvPr>
+            <p:ph type="title"/>
+          </p:nvPr>
+        </p:nvSpPr>
+        <p:spPr/>
+        <p:txBody>
+          <a:bodyPr/>
+          <a:lstStyle/>
+          <a:p>
+            <a:r>
+              <a:rPr lang="en-US" dirty="0" smtClean="0"/>
+              <a:t>Growing Complexity, Growing Data, More Users</a:t>
+            </a:r>
+            <a:endParaRPr lang="en-US" dirty="0"/>
+          </a:p>
+        </p:txBody>
+      </p:sp>
+      <p:sp>
+        <p:nvSpPr>
+          <p:cNvPr id="3" name="Text Placeholder 2"/>
+          <p:cNvSpPr>
+            <a:spLocks noGrp="1"/>
+          </p:cNvSpPr>
+          <p:nvPr>
+            <p:ph type="body" sz="quarter" idx="10"/>
+          </p:nvPr>
+        </p:nvSpPr>
+        <p:spPr/>
+        <p:txBody>
+          <a:bodyPr/>
+          <a:lstStyle/>
+          <a:p>
+            <a:pPr lvl="0"/>
+            <a:r>
+              <a:rPr lang="en-US" dirty="0" smtClean="0"/>
+              <a:t>5o5 Worlds 2012, La Rochelle, France</a:t>
+            </a:r>
+          </a:p>
+          <a:p>
+            <a:pPr lvl="2"/>
+            <a:r>
+              <a:rPr lang="en-US" dirty="0" smtClean="0"/>
+              <a:t>~190 boats in one fleet, racing concurrently</a:t>
+            </a:r>
+          </a:p>
+          <a:p>
+            <a:pPr lvl="2"/>
+            <a:r>
+              <a:rPr lang="en-US" dirty="0" smtClean="0"/>
+              <a:t>Races last about two hours each</a:t>
+            </a:r>
+          </a:p>
+          <a:p>
+            <a:pPr lvl="2"/>
+            <a:r>
+              <a:rPr lang="en-US" dirty="0" smtClean="0"/>
+              <a:t>In addition to commentary, several users in VIP lounge and on tablet devices</a:t>
+            </a:r>
+          </a:p>
+          <a:p>
+            <a:r>
+              <a:rPr lang="en-US" dirty="0" smtClean="0"/>
+              <a:t>Where “insert-only” and “aggregate on the fly” bit us</a:t>
+            </a:r>
+          </a:p>
+          <a:p>
+            <a:pPr lvl="1"/>
+            <a:r>
+              <a:rPr lang="en-US" dirty="0" smtClean="0"/>
+              <a:t>Simple example: distance traveled for one competitor</a:t>
+            </a:r>
+          </a:p>
+          <a:p>
+            <a:pPr lvl="2"/>
+            <a:r>
+              <a:rPr lang="en-US" dirty="0" smtClean="0"/>
+              <a:t>Find first fix at or after start line passing</a:t>
+            </a:r>
+          </a:p>
+          <a:p>
+            <a:pPr lvl="2"/>
+            <a:r>
+              <a:rPr lang="en-US" dirty="0" smtClean="0"/>
+              <a:t>Sum up great-circle distance to the next fix that’s not an outlier</a:t>
+            </a:r>
+          </a:p>
+          <a:p>
+            <a:pPr lvl="1"/>
+            <a:r>
+              <a:rPr lang="en-US" dirty="0" smtClean="0"/>
+              <a:t>For a leader-board that’s O(c*f) with c=number </a:t>
+            </a:r>
+            <a:r>
+              <a:rPr lang="en-US" smtClean="0"/>
+              <a:t>of competitors and f=number of fixes</a:t>
+            </a:r>
+          </a:p>
+          <a:p>
+            <a:pPr lvl="1"/>
+            <a:endParaRPr lang="en-US" dirty="0" smtClean="0"/>
+          </a:p>
+          <a:p>
+            <a:pPr lvl="1"/>
+            <a:r>
+              <a:rPr lang="en-US" dirty="0" smtClean="0"/>
+              <a:t>Java and OSGi, </a:t>
+            </a:r>
+            <a:r>
+              <a:rPr lang="en-US" dirty="0" err="1" smtClean="0"/>
+              <a:t>Git</a:t>
+            </a:r>
+            <a:r>
+              <a:rPr lang="en-US" dirty="0" smtClean="0"/>
+              <a:t>, Maven, </a:t>
+            </a:r>
+            <a:r>
+              <a:rPr lang="en-US" dirty="0" err="1" smtClean="0"/>
+              <a:t>MongoDB</a:t>
+            </a:r>
+            <a:endParaRPr lang="en-US" dirty="0" smtClean="0"/>
+          </a:p>
+          <a:p>
+            <a:pPr lvl="1"/>
+            <a:r>
+              <a:rPr lang="en-US" dirty="0" smtClean="0"/>
+              <a:t>Recording and Analyzing Real-World Data in Memory with Java</a:t>
+            </a:r>
+          </a:p>
+          <a:p>
+            <a:pPr lvl="0"/>
+            <a:endParaRPr lang="en-US" dirty="0" smtClean="0"/>
+          </a:p>
+          <a:p>
+            <a:pPr lvl="1"/>
+            <a:r>
+              <a:rPr lang="en-US" dirty="0" smtClean="0"/>
+              <a:t>Second level</a:t>
+            </a:r>
+          </a:p>
+          <a:p>
+            <a:pPr lvl="2"/>
+            <a:r>
+              <a:rPr lang="en-US" dirty="0" smtClean="0"/>
+              <a:t>Third level</a:t>
+            </a:r>
+          </a:p>
+        </p:txBody>
+      </p:sp>
+    </p:spTree>
+  </p:cSld>
+  <p:clrMapOvr>
+    <a:masterClrMapping/>
+  </p:clrMapOvr>
+  <p:transition spd="med"/>
+  <p:timing>
+    <p:tnLst>
+      <p:par>
+        <p:cTn id="1" dur="indefinite" restart="never" nodeType="tmRoot"/>
+      </p:par>
+    </p:tnLst>
+  </p:timing>
+</p:sld>
+</file>
+
+<file path=ppt/slides/slide24.xml><?xml version="1.0" encoding="utf-8"?>
+<p:sld xmlns:a="http://schemas.openxmlformats.org/drawingml/2006/main" xmlns:r="http://schemas.openxmlformats.org/officeDocument/2006/relationships" xmlns:p="http://schemas.openxmlformats.org/presentationml/2006/main">
+  <p:cSld>
+    <p:spTree>
+      <p:nvGrpSpPr>
+        <p:cNvPr id="1" name=""/>
+        <p:cNvGrpSpPr/>
+        <p:nvPr/>
+      </p:nvGrpSpPr>
+      <p:grpSpPr>
+        <a:xfrm>
+          <a:off x="0" y="0"/>
+          <a:ext cx="0" cy="0"/>
+          <a:chOff x="0" y="0"/>
+          <a:chExt cx="0" cy="0"/>
+        </a:xfrm>
+      </p:grpSpPr>
+      <p:sp>
+        <p:nvSpPr>
+          <p:cNvPr id="2" name="Title 1"/>
+          <p:cNvSpPr>
+            <a:spLocks noGrp="1"/>
+          </p:cNvSpPr>
+          <p:nvPr>
+            <p:ph type="title"/>
+          </p:nvPr>
+        </p:nvSpPr>
+        <p:spPr/>
+        <p:txBody>
+          <a:bodyPr/>
+          <a:lstStyle/>
+          <a:p>
+            <a:r>
+              <a:rPr lang="en-US" dirty="0" smtClean="0"/>
               <a:t>Insert page title </a:t>
             </a:r>
             <a:endParaRPr lang="en-US" dirty="0"/>
@@ -11191,7 +11646,7 @@
 </p:sld>
 </file>
 
-<file path=ppt/slides/slide21.xml><?xml version="1.0" encoding="utf-8"?>
+<file path=ppt/slides/slide25.xml><?xml version="1.0" encoding="utf-8"?>
 <p:sld xmlns:a="http://schemas.openxmlformats.org/drawingml/2006/main" xmlns:r="http://schemas.openxmlformats.org/officeDocument/2006/relationships" xmlns:p="http://schemas.openxmlformats.org/presentationml/2006/main">
   <p:cSld>
     <p:spTree>
@@ -11484,433 +11939,6 @@
             </p:seq>
           </p:childTnLst>
         </p:cTn>
-      </p:par>
-    </p:tnLst>
-  </p:timing>
-</p:sld>
-</file>
-
-<file path=ppt/slides/slide22.xml><?xml version="1.0" encoding="utf-8"?>
-<p:sld xmlns:a="http://schemas.openxmlformats.org/drawingml/2006/main" xmlns:r="http://schemas.openxmlformats.org/officeDocument/2006/relationships" xmlns:p="http://schemas.openxmlformats.org/presentationml/2006/main">
-  <p:cSld>
-    <p:spTree>
-      <p:nvGrpSpPr>
-        <p:cNvPr id="1" name=""/>
-        <p:cNvGrpSpPr/>
-        <p:nvPr/>
-      </p:nvGrpSpPr>
-      <p:grpSpPr>
-        <a:xfrm>
-          <a:off x="0" y="0"/>
-          <a:ext cx="0" cy="0"/>
-          <a:chOff x="0" y="0"/>
-          <a:chExt cx="0" cy="0"/>
-        </a:xfrm>
-      </p:grpSpPr>
-      <p:sp>
-        <p:nvSpPr>
-          <p:cNvPr id="3" name="Title 2"/>
-          <p:cNvSpPr>
-            <a:spLocks noGrp="1"/>
-          </p:cNvSpPr>
-          <p:nvPr>
-            <p:ph type="ctrTitle"/>
-          </p:nvPr>
-        </p:nvSpPr>
-        <p:spPr/>
-        <p:txBody>
-          <a:bodyPr/>
-          <a:lstStyle/>
-          <a:p>
-            <a:r>
-              <a:rPr lang="en-US" sz="3200" dirty="0" smtClean="0"/>
-              <a:t>Towards Web Bundles and </a:t>
-            </a:r>
-            <a:r>
-              <a:rPr lang="en-US" sz="3200" dirty="0" err="1" smtClean="0"/>
-              <a:t>Restlets</a:t>
-            </a:r>
-            <a:endParaRPr lang="en-US" sz="3200" dirty="0" smtClean="0"/>
-          </a:p>
-        </p:txBody>
-      </p:sp>
-      <p:pic>
-        <p:nvPicPr>
-          <p:cNvPr id="7" name="Picture 2" descr="C:\Users\d019534\AppData\Local\Microsoft\Windows\Temporary Internet Files\Content.IE5\M8B9MV8Z\273539_l_srgb_s_gl[1].jpg"/>
-          <p:cNvPicPr>
-            <a:picLocks noGrp="1" noChangeAspect="1" noChangeArrowheads="1"/>
-          </p:cNvPicPr>
-          <p:nvPr>
-            <p:ph type="pic" sz="quarter" idx="11"/>
-          </p:nvPr>
-        </p:nvPicPr>
-        <p:blipFill rotWithShape="1">
-          <a:blip r:embed="rId3" cstate="screen">
-            <a:extLst>
-              <a:ext uri="{28A0092B-C50C-407E-A947-70E740481C1C}">
-                <a14:useLocalDpi xmlns:a14="http://schemas.microsoft.com/office/drawing/2010/main" xmlns=""/>
-              </a:ext>
-            </a:extLst>
-          </a:blip>
-          <a:srcRect l="10" r="10"/>
-          <a:stretch/>
-        </p:blipFill>
-        <p:spPr bwMode="auto">
-          <a:prstGeom prst="rect">
-            <a:avLst/>
-          </a:prstGeom>
-          <a:noFill/>
-          <a:ln>
-            <a:noFill/>
-          </a:ln>
-          <a:extLst>
-            <a:ext uri="{909E8E84-426E-40DD-AFC4-6F175D3DCCD1}">
-              <a14:hiddenFill xmlns:a14="http://schemas.microsoft.com/office/drawing/2010/main" xmlns="">
-                <a:solidFill>
-                  <a:srgbClr val="FFFFFF"/>
-                </a:solidFill>
-              </a14:hiddenFill>
-            </a:ext>
-          </a:extLst>
-        </p:spPr>
-      </p:pic>
-    </p:spTree>
-  </p:cSld>
-  <p:clrMapOvr>
-    <a:masterClrMapping/>
-  </p:clrMapOvr>
-</p:sld>
-</file>
-
-<file path=ppt/slides/slide23.xml><?xml version="1.0" encoding="utf-8"?>
-<p:sld xmlns:a="http://schemas.openxmlformats.org/drawingml/2006/main" xmlns:r="http://schemas.openxmlformats.org/officeDocument/2006/relationships" xmlns:p="http://schemas.openxmlformats.org/presentationml/2006/main">
-  <p:cSld>
-    <p:spTree>
-      <p:nvGrpSpPr>
-        <p:cNvPr id="1" name=""/>
-        <p:cNvGrpSpPr/>
-        <p:nvPr/>
-      </p:nvGrpSpPr>
-      <p:grpSpPr>
-        <a:xfrm>
-          <a:off x="0" y="0"/>
-          <a:ext cx="0" cy="0"/>
-          <a:chOff x="0" y="0"/>
-          <a:chExt cx="0" cy="0"/>
-        </a:xfrm>
-      </p:grpSpPr>
-      <p:sp>
-        <p:nvSpPr>
-          <p:cNvPr id="2" name="Title 1"/>
-          <p:cNvSpPr>
-            <a:spLocks noGrp="1"/>
-          </p:cNvSpPr>
-          <p:nvPr>
-            <p:ph type="title"/>
-          </p:nvPr>
-        </p:nvSpPr>
-        <p:spPr/>
-        <p:txBody>
-          <a:bodyPr/>
-          <a:lstStyle/>
-          <a:p>
-            <a:r>
-              <a:rPr lang="en-US" dirty="0" smtClean="0"/>
-              <a:t>Insert page title </a:t>
-            </a:r>
-            <a:endParaRPr lang="en-US" dirty="0"/>
-          </a:p>
-        </p:txBody>
-      </p:sp>
-      <p:sp>
-        <p:nvSpPr>
-          <p:cNvPr id="3" name="Text Placeholder 2"/>
-          <p:cNvSpPr>
-            <a:spLocks noGrp="1"/>
-          </p:cNvSpPr>
-          <p:nvPr>
-            <p:ph type="body" sz="quarter" idx="10"/>
-          </p:nvPr>
-        </p:nvSpPr>
-        <p:spPr/>
-        <p:txBody>
-          <a:bodyPr/>
-          <a:lstStyle/>
-          <a:p>
-            <a:pPr lvl="0"/>
-            <a:r>
-              <a:rPr lang="en-US" dirty="0" smtClean="0"/>
-              <a:t>First level</a:t>
-            </a:r>
-          </a:p>
-          <a:p>
-            <a:pPr lvl="1"/>
-            <a:r>
-              <a:rPr lang="en-US" dirty="0" smtClean="0"/>
-              <a:t>Java and OSGi, </a:t>
-            </a:r>
-            <a:r>
-              <a:rPr lang="en-US" dirty="0" err="1" smtClean="0"/>
-              <a:t>Git</a:t>
-            </a:r>
-            <a:r>
-              <a:rPr lang="en-US" dirty="0" smtClean="0"/>
-              <a:t>, Maven, </a:t>
-            </a:r>
-            <a:r>
-              <a:rPr lang="en-US" dirty="0" err="1" smtClean="0"/>
-              <a:t>MongoDB</a:t>
-            </a:r>
-            <a:endParaRPr lang="en-US" dirty="0" smtClean="0"/>
-          </a:p>
-          <a:p>
-            <a:pPr lvl="1"/>
-            <a:r>
-              <a:rPr lang="en-US" dirty="0" smtClean="0"/>
-              <a:t>Recording and Analyzing Real-World Data in Memory with Java</a:t>
-            </a:r>
-          </a:p>
-          <a:p>
-            <a:pPr lvl="0"/>
-            <a:endParaRPr lang="en-US" dirty="0" smtClean="0"/>
-          </a:p>
-          <a:p>
-            <a:pPr lvl="1"/>
-            <a:r>
-              <a:rPr lang="en-US" dirty="0" smtClean="0"/>
-              <a:t>Second level</a:t>
-            </a:r>
-          </a:p>
-          <a:p>
-            <a:pPr lvl="2"/>
-            <a:r>
-              <a:rPr lang="en-US" dirty="0" smtClean="0"/>
-              <a:t>Third level</a:t>
-            </a:r>
-          </a:p>
-        </p:txBody>
-      </p:sp>
-    </p:spTree>
-  </p:cSld>
-  <p:clrMapOvr>
-    <a:masterClrMapping/>
-  </p:clrMapOvr>
-  <p:transition spd="med"/>
-  <p:timing>
-    <p:tnLst>
-      <p:par>
-        <p:cTn id="1" dur="indefinite" restart="never" nodeType="tmRoot"/>
-      </p:par>
-    </p:tnLst>
-  </p:timing>
-</p:sld>
-</file>
-
-<file path=ppt/slides/slide24.xml><?xml version="1.0" encoding="utf-8"?>
-<p:sld xmlns:a="http://schemas.openxmlformats.org/drawingml/2006/main" xmlns:r="http://schemas.openxmlformats.org/officeDocument/2006/relationships" xmlns:p="http://schemas.openxmlformats.org/presentationml/2006/main">
-  <p:cSld>
-    <p:spTree>
-      <p:nvGrpSpPr>
-        <p:cNvPr id="1" name=""/>
-        <p:cNvGrpSpPr/>
-        <p:nvPr/>
-      </p:nvGrpSpPr>
-      <p:grpSpPr>
-        <a:xfrm>
-          <a:off x="0" y="0"/>
-          <a:ext cx="0" cy="0"/>
-          <a:chOff x="0" y="0"/>
-          <a:chExt cx="0" cy="0"/>
-        </a:xfrm>
-      </p:grpSpPr>
-      <p:sp>
-        <p:nvSpPr>
-          <p:cNvPr id="3" name="Title 2"/>
-          <p:cNvSpPr>
-            <a:spLocks noGrp="1"/>
-          </p:cNvSpPr>
-          <p:nvPr>
-            <p:ph type="ctrTitle"/>
-          </p:nvPr>
-        </p:nvSpPr>
-        <p:spPr/>
-        <p:txBody>
-          <a:bodyPr/>
-          <a:lstStyle/>
-          <a:p>
-            <a:r>
-              <a:rPr lang="en-US" sz="3200" dirty="0" smtClean="0"/>
-              <a:t>Caching and Locking in a Highly Concurrent Environment</a:t>
-            </a:r>
-          </a:p>
-        </p:txBody>
-      </p:sp>
-      <p:pic>
-        <p:nvPicPr>
-          <p:cNvPr id="7" name="Picture 2" descr="C:\Users\d019534\AppData\Local\Microsoft\Windows\Temporary Internet Files\Content.IE5\M8B9MV8Z\273539_l_srgb_s_gl[1].jpg"/>
-          <p:cNvPicPr>
-            <a:picLocks noGrp="1" noChangeAspect="1" noChangeArrowheads="1"/>
-          </p:cNvPicPr>
-          <p:nvPr>
-            <p:ph type="pic" sz="quarter" idx="11"/>
-          </p:nvPr>
-        </p:nvPicPr>
-        <p:blipFill rotWithShape="1">
-          <a:blip r:embed="rId3" cstate="screen">
-            <a:extLst>
-              <a:ext uri="{28A0092B-C50C-407E-A947-70E740481C1C}">
-                <a14:useLocalDpi xmlns:a14="http://schemas.microsoft.com/office/drawing/2010/main" xmlns=""/>
-              </a:ext>
-            </a:extLst>
-          </a:blip>
-          <a:srcRect l="10" r="10"/>
-          <a:stretch/>
-        </p:blipFill>
-        <p:spPr bwMode="auto">
-          <a:prstGeom prst="rect">
-            <a:avLst/>
-          </a:prstGeom>
-          <a:noFill/>
-          <a:ln>
-            <a:noFill/>
-          </a:ln>
-          <a:extLst>
-            <a:ext uri="{909E8E84-426E-40DD-AFC4-6F175D3DCCD1}">
-              <a14:hiddenFill xmlns:a14="http://schemas.microsoft.com/office/drawing/2010/main" xmlns="">
-                <a:solidFill>
-                  <a:srgbClr val="FFFFFF"/>
-                </a:solidFill>
-              </a14:hiddenFill>
-            </a:ext>
-          </a:extLst>
-        </p:spPr>
-      </p:pic>
-    </p:spTree>
-  </p:cSld>
-  <p:clrMapOvr>
-    <a:masterClrMapping/>
-  </p:clrMapOvr>
-</p:sld>
-</file>
-
-<file path=ppt/slides/slide25.xml><?xml version="1.0" encoding="utf-8"?>
-<p:sld xmlns:a="http://schemas.openxmlformats.org/drawingml/2006/main" xmlns:r="http://schemas.openxmlformats.org/officeDocument/2006/relationships" xmlns:p="http://schemas.openxmlformats.org/presentationml/2006/main">
-  <p:cSld>
-    <p:spTree>
-      <p:nvGrpSpPr>
-        <p:cNvPr id="1" name=""/>
-        <p:cNvGrpSpPr/>
-        <p:nvPr/>
-      </p:nvGrpSpPr>
-      <p:grpSpPr>
-        <a:xfrm>
-          <a:off x="0" y="0"/>
-          <a:ext cx="0" cy="0"/>
-          <a:chOff x="0" y="0"/>
-          <a:chExt cx="0" cy="0"/>
-        </a:xfrm>
-      </p:grpSpPr>
-      <p:sp>
-        <p:nvSpPr>
-          <p:cNvPr id="2" name="Title 1"/>
-          <p:cNvSpPr>
-            <a:spLocks noGrp="1"/>
-          </p:cNvSpPr>
-          <p:nvPr>
-            <p:ph type="title"/>
-          </p:nvPr>
-        </p:nvSpPr>
-        <p:spPr/>
-        <p:txBody>
-          <a:bodyPr/>
-          <a:lstStyle/>
-          <a:p>
-            <a:r>
-              <a:rPr lang="en-US" dirty="0" smtClean="0"/>
-              <a:t>Insert page title </a:t>
-            </a:r>
-            <a:endParaRPr lang="en-US" dirty="0"/>
-          </a:p>
-        </p:txBody>
-      </p:sp>
-      <p:sp>
-        <p:nvSpPr>
-          <p:cNvPr id="3" name="Text Placeholder 2"/>
-          <p:cNvSpPr>
-            <a:spLocks noGrp="1"/>
-          </p:cNvSpPr>
-          <p:nvPr>
-            <p:ph type="body" sz="quarter" idx="10"/>
-          </p:nvPr>
-        </p:nvSpPr>
-        <p:spPr/>
-        <p:txBody>
-          <a:bodyPr/>
-          <a:lstStyle/>
-          <a:p>
-            <a:pPr lvl="0"/>
-            <a:r>
-              <a:rPr lang="en-US" dirty="0" smtClean="0"/>
-              <a:t>First level</a:t>
-            </a:r>
-          </a:p>
-          <a:p>
-            <a:pPr lvl="1"/>
-            <a:r>
-              <a:rPr lang="en-US" dirty="0" smtClean="0"/>
-              <a:t>Java and OSGi, </a:t>
-            </a:r>
-            <a:r>
-              <a:rPr lang="en-US" dirty="0" err="1" smtClean="0"/>
-              <a:t>Git</a:t>
-            </a:r>
-            <a:r>
-              <a:rPr lang="en-US" dirty="0" smtClean="0"/>
-              <a:t>, Maven, </a:t>
-            </a:r>
-            <a:r>
-              <a:rPr lang="en-US" dirty="0" err="1" smtClean="0"/>
-              <a:t>MongoDB</a:t>
-            </a:r>
-            <a:endParaRPr lang="en-US" dirty="0" smtClean="0"/>
-          </a:p>
-          <a:p>
-            <a:pPr lvl="1"/>
-            <a:r>
-              <a:rPr lang="en-US" dirty="0" smtClean="0"/>
-              <a:t>Recording and Analyzing Real-World Data in Memory with Java</a:t>
-            </a:r>
-          </a:p>
-          <a:p>
-            <a:pPr lvl="0"/>
-            <a:endParaRPr lang="en-US" dirty="0" smtClean="0"/>
-          </a:p>
-          <a:p>
-            <a:pPr lvl="1"/>
-            <a:r>
-              <a:rPr lang="en-US" dirty="0" smtClean="0"/>
-              <a:t>Second level</a:t>
-            </a:r>
-          </a:p>
-          <a:p>
-            <a:pPr lvl="2"/>
-            <a:r>
-              <a:rPr lang="en-US" dirty="0" smtClean="0"/>
-              <a:t>Third level</a:t>
-            </a:r>
-          </a:p>
-        </p:txBody>
-      </p:sp>
-    </p:spTree>
-  </p:cSld>
-  <p:clrMapOvr>
-    <a:masterClrMapping/>
-  </p:clrMapOvr>
-  <p:transition spd="med"/>
-  <p:timing>
-    <p:tnLst>
-      <p:par>
-        <p:cTn id="1" dur="indefinite" restart="never" nodeType="tmRoot"/>
       </p:par>
     </p:tnLst>
   </p:timing>

</xml_diff>